<commit_message>
Change master to slave for workflows (left projects current use)
</commit_message>
<xml_diff>
--- a/git-workflows.pptx
+++ b/git-workflows.pptx
@@ -7693,7 +7693,7 @@
             </a:pPr>
             <a:r>
               <a:rPr lang="en-US" dirty="0"/>
-              <a:t>How are develop and master synchronized?</a:t>
+              <a:t>How are develop and main synchronized?</a:t>
             </a:r>
           </a:p>
           <a:p>
@@ -7852,6 +7852,48 @@
           </a:prstGeom>
         </p:spPr>
       </p:pic>
+      <p:sp>
+        <p:nvSpPr>
+          <p:cNvPr id="9" name="TextBox 8">
+            <a:extLst>
+              <a:ext uri="{FF2B5EF4-FFF2-40B4-BE49-F238E27FC236}">
+                <a16:creationId xmlns:a16="http://schemas.microsoft.com/office/drawing/2014/main" id="{2802D390-BEBC-A647-AFDC-5E606EA03997}"/>
+              </a:ext>
+            </a:extLst>
+          </p:cNvPr>
+          <p:cNvSpPr txBox="1"/>
+          <p:nvPr/>
+        </p:nvSpPr>
+        <p:spPr>
+          <a:xfrm>
+            <a:off x="3828641" y="730444"/>
+            <a:ext cx="822960" cy="295466"/>
+          </a:xfrm>
+          <a:prstGeom prst="rect">
+            <a:avLst/>
+          </a:prstGeom>
+          <a:solidFill>
+            <a:schemeClr val="bg1"/>
+          </a:solidFill>
+        </p:spPr>
+        <p:txBody>
+          <a:bodyPr wrap="square" lIns="118872" tIns="91440" rIns="118872" bIns="91440" rtlCol="0" anchor="ctr" anchorCtr="0">
+            <a:spAutoFit/>
+          </a:bodyPr>
+          <a:lstStyle/>
+          <a:p>
+            <a:pPr algn="l">
+              <a:lnSpc>
+                <a:spcPct val="90000"/>
+              </a:lnSpc>
+            </a:pPr>
+            <a:r>
+              <a:rPr lang="en-US" sz="800" b="1" dirty="0"/>
+              <a:t>  main  </a:t>
+            </a:r>
+          </a:p>
+        </p:txBody>
+      </p:sp>
     </p:spTree>
     <p:extLst>
       <p:ext uri="{BB962C8B-B14F-4D97-AF65-F5344CB8AC3E}">
@@ -7928,7 +7970,7 @@
         </p:nvSpPr>
         <p:spPr>
           <a:xfrm>
-            <a:off x="365760" y="1197717"/>
+            <a:off x="368424" y="1197717"/>
             <a:ext cx="11369809" cy="4047778"/>
           </a:xfrm>
         </p:spPr>
@@ -7990,7 +8032,7 @@
             </a:pPr>
             <a:r>
               <a:rPr lang="en-US" sz="2000" dirty="0"/>
-              <a:t>All commits in master are </a:t>
+              <a:t>All commits in the main branch are </a:t>
             </a:r>
             <a:r>
               <a:rPr lang="en-US" sz="2000" b="1" dirty="0"/>
@@ -8004,7 +8046,7 @@
             </a:pPr>
             <a:r>
               <a:rPr lang="en-US" sz="2000" dirty="0"/>
-              <a:t>Base feature branches off of master</a:t>
+              <a:t>Base feature branches off of main</a:t>
             </a:r>
           </a:p>
           <a:p>
@@ -8034,7 +8076,7 @@
             </a:pPr>
             <a:r>
               <a:rPr lang="en-US" sz="2000" dirty="0"/>
-              <a:t>Merge into master after Pull Request review </a:t>
+              <a:t>Merge into main after Pull Request review </a:t>
             </a:r>
           </a:p>
         </p:txBody>
@@ -8179,7 +8221,7 @@
           <a:p>
             <a:r>
               <a:rPr lang="en-US" sz="2000" dirty="0"/>
-              <a:t>Mature code in master flows downstream into pre-production &amp; production infinite lifetime branches</a:t>
+              <a:t>Mature code in main flows downstream into pre-production &amp; production infinite lifetime branches</a:t>
             </a:r>
           </a:p>
           <a:p>
@@ -15274,18 +15316,18 @@
 </file>
 
 <file path=customXml/item2.xml><?xml version="1.0" encoding="utf-8"?>
-<p:properties xmlns:p="http://schemas.microsoft.com/office/2006/metadata/properties" xmlns:xsi="http://www.w3.org/2001/XMLSchema-instance" xmlns:pc="http://schemas.microsoft.com/office/infopath/2007/PartnerControls">
-  <documentManagement/>
-</p:properties>
-</file>
-
-<file path=customXml/item3.xml><?xml version="1.0" encoding="utf-8"?>
 <?mso-contentType ?>
 <FormTemplates xmlns="http://schemas.microsoft.com/sharepoint/v3/contenttype/forms">
   <Display>DocumentLibraryForm</Display>
   <Edit>DocumentLibraryForm</Edit>
   <New>DocumentLibraryForm</New>
 </FormTemplates>
+</file>
+
+<file path=customXml/item3.xml><?xml version="1.0" encoding="utf-8"?>
+<p:properties xmlns:p="http://schemas.microsoft.com/office/2006/metadata/properties" xmlns:xsi="http://www.w3.org/2001/XMLSchema-instance" xmlns:pc="http://schemas.microsoft.com/office/infopath/2007/PartnerControls">
+  <documentManagement/>
+</p:properties>
 </file>
 
 <file path=customXml/itemProps1.xml><?xml version="1.0" encoding="utf-8"?>
@@ -15304,6 +15346,14 @@
 </file>
 
 <file path=customXml/itemProps2.xml><?xml version="1.0" encoding="utf-8"?>
+<ds:datastoreItem xmlns:ds="http://schemas.openxmlformats.org/officeDocument/2006/customXml" ds:itemID="{19E20559-B232-4371-8690-E3D8007EDB82}">
+  <ds:schemaRefs>
+    <ds:schemaRef ds:uri="http://schemas.microsoft.com/sharepoint/v3/contenttype/forms"/>
+  </ds:schemaRefs>
+</ds:datastoreItem>
+</file>
+
+<file path=customXml/itemProps3.xml><?xml version="1.0" encoding="utf-8"?>
 <ds:datastoreItem xmlns:ds="http://schemas.openxmlformats.org/officeDocument/2006/customXml" ds:itemID="{A50EC660-24D0-43A0-AE5E-E274115E726B}">
   <ds:schemaRefs>
     <ds:schemaRef ds:uri="http://purl.org/dc/elements/1.1/"/>
@@ -15316,12 +15366,4 @@
     <ds:schemaRef ds:uri="http://schemas.microsoft.com/office/infopath/2007/PartnerControls"/>
   </ds:schemaRefs>
 </ds:datastoreItem>
-</file>
-
-<file path=customXml/itemProps3.xml><?xml version="1.0" encoding="utf-8"?>
-<ds:datastoreItem xmlns:ds="http://schemas.openxmlformats.org/officeDocument/2006/customXml" ds:itemID="{19E20559-B232-4371-8690-E3D8007EDB82}">
-  <ds:schemaRefs>
-    <ds:schemaRef ds:uri="http://schemas.microsoft.com/sharepoint/v3/contenttype/forms"/>
-  </ds:schemaRefs>
-</ds:datastoreItem>
 </file>
</xml_diff>

<commit_message>
Change master to main for Trilinos and OpenMPI
</commit_message>
<xml_diff>
--- a/git-workflows.pptx
+++ b/git-workflows.pptx
@@ -9122,7 +9122,7 @@
           <a:p>
             <a:r>
               <a:rPr lang="en-US" sz="2000" dirty="0"/>
-              <a:t>Change sets from develop are tested daily for integration into master</a:t>
+              <a:t>Change sets from develop are tested daily for integration into main</a:t>
             </a:r>
           </a:p>
           <a:p>
@@ -9187,7 +9187,7 @@
             </a:pPr>
             <a:r>
               <a:rPr lang="en-US" sz="2000" dirty="0"/>
-              <a:t>All commits in master are in develop</a:t>
+              <a:t>All commits in main are in develop</a:t>
             </a:r>
           </a:p>
           <a:p>
@@ -9219,7 +9219,7 @@
             </a:pPr>
             <a:r>
               <a:rPr lang="en-US" sz="2000" dirty="0"/>
-              <a:t>Merge conflicts never occur when promoting to master</a:t>
+              <a:t>Merge conflicts never occur when promoting to main</a:t>
             </a:r>
           </a:p>
           <a:p>
@@ -9384,7 +9384,7 @@
         <p:spPr>
           <a:xfrm>
             <a:off x="1146365" y="4368064"/>
-            <a:ext cx="945387" cy="433965"/>
+            <a:ext cx="740203" cy="433965"/>
           </a:xfrm>
           <a:prstGeom prst="rect">
             <a:avLst/>
@@ -9404,7 +9404,7 @@
             </a:pPr>
             <a:r>
               <a:rPr lang="en-US" dirty="0"/>
-              <a:t>master</a:t>
+              <a:t>main</a:t>
             </a:r>
           </a:p>
         </p:txBody>
@@ -9716,7 +9716,7 @@
                   </a:schemeClr>
                 </a:solidFill>
               </a:rPr>
-              <a:t>develop -&gt; master testing</a:t>
+              <a:t>develop -&gt; main testing</a:t>
             </a:r>
           </a:p>
         </p:txBody>
@@ -10551,7 +10551,7 @@
             </a:pPr>
             <a:r>
               <a:rPr lang="en-US" sz="2000" dirty="0"/>
-              <a:t>Developers work on master or feature branches depending on complexity of the changes</a:t>
+              <a:t>Developers work on main or feature branches depending on complexity of the changes</a:t>
             </a:r>
           </a:p>
           <a:p>
@@ -10778,7 +10778,7 @@
         <p:spPr>
           <a:xfrm>
             <a:off x="413308" y="3151337"/>
-            <a:ext cx="945387" cy="433965"/>
+            <a:ext cx="740203" cy="433965"/>
           </a:xfrm>
           <a:prstGeom prst="rect">
             <a:avLst/>
@@ -10798,7 +10798,7 @@
             </a:pPr>
             <a:r>
               <a:rPr lang="en-US" dirty="0"/>
-              <a:t>master</a:t>
+              <a:t>main</a:t>
             </a:r>
           </a:p>
         </p:txBody>
@@ -12788,7 +12788,7 @@
         </p:nvSpPr>
         <p:spPr>
           <a:xfrm>
-            <a:off x="365760" y="1226999"/>
+            <a:off x="365760" y="1008354"/>
             <a:ext cx="9839395" cy="4841291"/>
           </a:xfrm>
         </p:spPr>
@@ -12864,12 +12864,6 @@
             <a:r>
               <a:rPr lang="en-US" dirty="0"/>
               <a:t>What to think about when evaluating different workflows</a:t>
-            </a:r>
-          </a:p>
-          <a:p>
-            <a:r>
-              <a:rPr lang="en-US" dirty="0"/>
-              <a:t>Extra:  Heat Equation Example Workflow</a:t>
             </a:r>
           </a:p>
           <a:p>
@@ -13000,27 +12994,27 @@
             <p:ph idx="1"/>
           </p:nvPr>
         </p:nvSpPr>
-        <p:spPr/>
+        <p:spPr>
+          <a:xfrm>
+            <a:off x="365760" y="1342249"/>
+            <a:ext cx="11369809" cy="4047778"/>
+          </a:xfrm>
+        </p:spPr>
         <p:txBody>
           <a:bodyPr/>
           <a:lstStyle/>
           <a:p>
             <a:r>
               <a:rPr lang="en-US" dirty="0"/>
-              <a:t>Historically git repository platforms used the term master as the default branch for the main branch. </a:t>
+              <a:t>Historically git repository platforms used the term main as the default branch for the main branch. </a:t>
             </a:r>
           </a:p>
           <a:p>
             <a:pPr lvl="1"/>
             <a:r>
               <a:rPr lang="en-US" dirty="0"/>
-              <a:t>The master-slave relationship in technology was used to refer to a system where one - the master - controls other copies, or </a:t>
-            </a:r>
-            <a:r>
-              <a:rPr lang="en-US"/>
-              <a:t>processes.</a:t>
-            </a:r>
-            <a:endParaRPr lang="en-US" dirty="0"/>
+              <a:t>The master-slave relationship in technology was used to refer to a system where one – the main - controls other copies, or processes.</a:t>
+            </a:r>
           </a:p>
           <a:p>
             <a:r>
@@ -15431,15 +15425,6 @@
 </file>
 
 <file path=customXml/item2.xml><?xml version="1.0" encoding="utf-8"?>
-<?mso-contentType ?>
-<FormTemplates xmlns="http://schemas.microsoft.com/sharepoint/v3/contenttype/forms">
-  <Display>DocumentLibraryForm</Display>
-  <Edit>DocumentLibraryForm</Edit>
-  <New>DocumentLibraryForm</New>
-</FormTemplates>
-</file>
-
-<file path=customXml/item3.xml><?xml version="1.0" encoding="utf-8"?>
 <ct:contentTypeSchema xmlns:ct="http://schemas.microsoft.com/office/2006/metadata/contentType" xmlns:ma="http://schemas.microsoft.com/office/2006/metadata/properties/metaAttributes" ct:_="" ma:_="" ma:contentTypeName="Document" ma:contentTypeID="0x010100565464437F680748A68B85EB6594EA7D" ma:contentTypeVersion="0" ma:contentTypeDescription="Create a new document." ma:contentTypeScope="" ma:versionID="fe3f4dd58d5914c51cfc6deaa8ad845c">
   <xsd:schema xmlns:xsd="http://www.w3.org/2001/XMLSchema" xmlns:p="http://schemas.microsoft.com/office/2006/metadata/properties" targetNamespace="http://schemas.microsoft.com/office/2006/metadata/properties" ma:root="true" ma:fieldsID="4aeb20c0e3442673af7ee10786458764">
     <xsd:element name="properties">
@@ -15488,6 +15473,15 @@
 </ct:contentTypeSchema>
 </file>
 
+<file path=customXml/item3.xml><?xml version="1.0" encoding="utf-8"?>
+<?mso-contentType ?>
+<FormTemplates xmlns="http://schemas.microsoft.com/sharepoint/v3/contenttype/forms">
+  <Display>DocumentLibraryForm</Display>
+  <Edit>DocumentLibraryForm</Edit>
+  <New>DocumentLibraryForm</New>
+</FormTemplates>
+</file>
+
 <file path=customXml/itemProps1.xml><?xml version="1.0" encoding="utf-8"?>
 <ds:datastoreItem xmlns:ds="http://schemas.openxmlformats.org/officeDocument/2006/customXml" ds:itemID="{A50EC660-24D0-43A0-AE5E-E274115E726B}">
   <ds:schemaRefs>
@@ -15504,14 +15498,6 @@
 </file>
 
 <file path=customXml/itemProps2.xml><?xml version="1.0" encoding="utf-8"?>
-<ds:datastoreItem xmlns:ds="http://schemas.openxmlformats.org/officeDocument/2006/customXml" ds:itemID="{19E20559-B232-4371-8690-E3D8007EDB82}">
-  <ds:schemaRefs>
-    <ds:schemaRef ds:uri="http://schemas.microsoft.com/sharepoint/v3/contenttype/forms"/>
-  </ds:schemaRefs>
-</ds:datastoreItem>
-</file>
-
-<file path=customXml/itemProps3.xml><?xml version="1.0" encoding="utf-8"?>
 <ds:datastoreItem xmlns:ds="http://schemas.openxmlformats.org/officeDocument/2006/customXml" ds:itemID="{E8DB7DEB-074E-4EE8-9B6E-FD277323109C}">
   <ds:schemaRefs>
     <ds:schemaRef ds:uri="http://schemas.microsoft.com/office/2006/metadata/contentType"/>
@@ -15524,4 +15510,12 @@
     <ds:schemaRef ds:uri="http://schemas.microsoft.com/office/internal/2005/internalDocumentation"/>
   </ds:schemaRefs>
 </ds:datastoreItem>
+</file>
+
+<file path=customXml/itemProps3.xml><?xml version="1.0" encoding="utf-8"?>
+<ds:datastoreItem xmlns:ds="http://schemas.openxmlformats.org/officeDocument/2006/customXml" ds:itemID="{19E20559-B232-4371-8690-E3D8007EDB82}">
+  <ds:schemaRefs>
+    <ds:schemaRef ds:uri="http://schemas.microsoft.com/sharepoint/v3/contenttype/forms"/>
+  </ds:schemaRefs>
+</ds:datastoreItem>
 </file>
</xml_diff>

<commit_message>
Added most of Mark's suggestions for inclusivity.
</commit_message>
<xml_diff>
--- a/git-workflows.pptx
+++ b/git-workflows.pptx
@@ -838,23 +838,6 @@
           <a:bodyPr/>
           <a:lstStyle/>
           <a:p>
-            <a:pPr marL="0" marR="0" lvl="0" indent="0" algn="l" defTabSz="914400" rtl="0" eaLnBrk="1" fontAlgn="auto" latinLnBrk="0" hangingPunct="1">
-              <a:lnSpc>
-                <a:spcPct val="100000"/>
-              </a:lnSpc>
-              <a:spcBef>
-                <a:spcPts val="0"/>
-              </a:spcBef>
-              <a:spcAft>
-                <a:spcPts val="0"/>
-              </a:spcAft>
-              <a:buClrTx/>
-              <a:buSzTx/>
-              <a:buFontTx/>
-              <a:buNone/>
-              <a:tabLst/>
-              <a:defRPr/>
-            </a:pPr>
             <a:endParaRPr lang="en-US" dirty="0"/>
           </a:p>
         </p:txBody>
@@ -876,7 +859,7 @@
           <a:p>
             <a:fld id="{54E672D7-8E2D-4611-973D-F4591A707C34}" type="slidenum">
               <a:rPr lang="en-US" smtClean="0"/>
-              <a:t>12</a:t>
+              <a:t>11</a:t>
             </a:fld>
             <a:endParaRPr lang="en-US"/>
           </a:p>
@@ -885,7 +868,7 @@
     </p:spTree>
     <p:extLst>
       <p:ext uri="{BB962C8B-B14F-4D97-AF65-F5344CB8AC3E}">
-        <p14:creationId xmlns:p14="http://schemas.microsoft.com/office/powerpoint/2010/main" val="36497045"/>
+        <p14:creationId xmlns:p14="http://schemas.microsoft.com/office/powerpoint/2010/main" val="3475076490"/>
       </p:ext>
     </p:extLst>
   </p:cSld>
@@ -939,6 +922,23 @@
           <a:bodyPr/>
           <a:lstStyle/>
           <a:p>
+            <a:pPr marL="0" marR="0" lvl="0" indent="0" algn="l" defTabSz="914400" rtl="0" eaLnBrk="1" fontAlgn="auto" latinLnBrk="0" hangingPunct="1">
+              <a:lnSpc>
+                <a:spcPct val="100000"/>
+              </a:lnSpc>
+              <a:spcBef>
+                <a:spcPts val="0"/>
+              </a:spcBef>
+              <a:spcAft>
+                <a:spcPts val="0"/>
+              </a:spcAft>
+              <a:buClrTx/>
+              <a:buSzTx/>
+              <a:buFontTx/>
+              <a:buNone/>
+              <a:tabLst/>
+              <a:defRPr/>
+            </a:pPr>
             <a:endParaRPr lang="en-US" dirty="0"/>
           </a:p>
         </p:txBody>
@@ -960,7 +960,7 @@
           <a:p>
             <a:fld id="{54E672D7-8E2D-4611-973D-F4591A707C34}" type="slidenum">
               <a:rPr lang="en-US" smtClean="0"/>
-              <a:t>13</a:t>
+              <a:t>12</a:t>
             </a:fld>
             <a:endParaRPr lang="en-US"/>
           </a:p>
@@ -969,7 +969,7 @@
     </p:spTree>
     <p:extLst>
       <p:ext uri="{BB962C8B-B14F-4D97-AF65-F5344CB8AC3E}">
-        <p14:creationId xmlns:p14="http://schemas.microsoft.com/office/powerpoint/2010/main" val="4077151903"/>
+        <p14:creationId xmlns:p14="http://schemas.microsoft.com/office/powerpoint/2010/main" val="36497045"/>
       </p:ext>
     </p:extLst>
   </p:cSld>
@@ -1034,7 +1034,7 @@
             <a:spLocks noGrp="1"/>
           </p:cNvSpPr>
           <p:nvPr>
-            <p:ph type="sldNum" sz="quarter" idx="5"/>
+            <p:ph type="sldNum" sz="quarter" idx="10"/>
           </p:nvPr>
         </p:nvSpPr>
         <p:spPr/>
@@ -1044,7 +1044,7 @@
           <a:p>
             <a:fld id="{54E672D7-8E2D-4611-973D-F4591A707C34}" type="slidenum">
               <a:rPr lang="en-US" smtClean="0"/>
-              <a:t>14</a:t>
+              <a:t>13</a:t>
             </a:fld>
             <a:endParaRPr lang="en-US"/>
           </a:p>
@@ -1053,7 +1053,7 @@
     </p:spTree>
     <p:extLst>
       <p:ext uri="{BB962C8B-B14F-4D97-AF65-F5344CB8AC3E}">
-        <p14:creationId xmlns:p14="http://schemas.microsoft.com/office/powerpoint/2010/main" val="684371905"/>
+        <p14:creationId xmlns:p14="http://schemas.microsoft.com/office/powerpoint/2010/main" val="4077151903"/>
       </p:ext>
     </p:extLst>
   </p:cSld>
@@ -1128,7 +1128,7 @@
           <a:p>
             <a:fld id="{54E672D7-8E2D-4611-973D-F4591A707C34}" type="slidenum">
               <a:rPr lang="en-US" smtClean="0"/>
-              <a:t>15</a:t>
+              <a:t>14</a:t>
             </a:fld>
             <a:endParaRPr lang="en-US"/>
           </a:p>
@@ -1137,7 +1137,7 @@
     </p:spTree>
     <p:extLst>
       <p:ext uri="{BB962C8B-B14F-4D97-AF65-F5344CB8AC3E}">
-        <p14:creationId xmlns:p14="http://schemas.microsoft.com/office/powerpoint/2010/main" val="2285743619"/>
+        <p14:creationId xmlns:p14="http://schemas.microsoft.com/office/powerpoint/2010/main" val="684371905"/>
       </p:ext>
     </p:extLst>
   </p:cSld>
@@ -1212,7 +1212,7 @@
           <a:p>
             <a:fld id="{54E672D7-8E2D-4611-973D-F4591A707C34}" type="slidenum">
               <a:rPr lang="en-US" smtClean="0"/>
-              <a:t>17</a:t>
+              <a:t>15</a:t>
             </a:fld>
             <a:endParaRPr lang="en-US"/>
           </a:p>
@@ -1221,7 +1221,7 @@
     </p:spTree>
     <p:extLst>
       <p:ext uri="{BB962C8B-B14F-4D97-AF65-F5344CB8AC3E}">
-        <p14:creationId xmlns:p14="http://schemas.microsoft.com/office/powerpoint/2010/main" val="1768817477"/>
+        <p14:creationId xmlns:p14="http://schemas.microsoft.com/office/powerpoint/2010/main" val="2285743619"/>
       </p:ext>
     </p:extLst>
   </p:cSld>
@@ -1286,7 +1286,7 @@
             <a:spLocks noGrp="1"/>
           </p:cNvSpPr>
           <p:nvPr>
-            <p:ph type="sldNum" sz="quarter" idx="10"/>
+            <p:ph type="sldNum" sz="quarter" idx="5"/>
           </p:nvPr>
         </p:nvSpPr>
         <p:spPr/>
@@ -1296,7 +1296,7 @@
           <a:p>
             <a:fld id="{54E672D7-8E2D-4611-973D-F4591A707C34}" type="slidenum">
               <a:rPr lang="en-US" smtClean="0"/>
-              <a:t>18</a:t>
+              <a:t>17</a:t>
             </a:fld>
             <a:endParaRPr lang="en-US"/>
           </a:p>
@@ -1305,7 +1305,7 @@
     </p:spTree>
     <p:extLst>
       <p:ext uri="{BB962C8B-B14F-4D97-AF65-F5344CB8AC3E}">
-        <p14:creationId xmlns:p14="http://schemas.microsoft.com/office/powerpoint/2010/main" val="2295497643"/>
+        <p14:creationId xmlns:p14="http://schemas.microsoft.com/office/powerpoint/2010/main" val="1768817477"/>
       </p:ext>
     </p:extLst>
   </p:cSld>
@@ -1380,7 +1380,7 @@
           <a:p>
             <a:fld id="{54E672D7-8E2D-4611-973D-F4591A707C34}" type="slidenum">
               <a:rPr lang="en-US" smtClean="0"/>
-              <a:t>19</a:t>
+              <a:t>18</a:t>
             </a:fld>
             <a:endParaRPr lang="en-US"/>
           </a:p>
@@ -1389,7 +1389,7 @@
     </p:spTree>
     <p:extLst>
       <p:ext uri="{BB962C8B-B14F-4D97-AF65-F5344CB8AC3E}">
-        <p14:creationId xmlns:p14="http://schemas.microsoft.com/office/powerpoint/2010/main" val="3622371461"/>
+        <p14:creationId xmlns:p14="http://schemas.microsoft.com/office/powerpoint/2010/main" val="2295497643"/>
       </p:ext>
     </p:extLst>
   </p:cSld>
@@ -1443,249 +1443,6 @@
           <a:bodyPr/>
           <a:lstStyle/>
           <a:p>
-            <a:r>
-              <a:rPr lang="en-US" sz="1200" b="0" i="1" kern="1200" dirty="0">
-                <a:solidFill>
-                  <a:schemeClr val="tx1"/>
-                </a:solidFill>
-                <a:effectLst/>
-                <a:latin typeface="+mn-lt"/>
-                <a:ea typeface="+mn-ea"/>
-                <a:cs typeface="+mn-cs"/>
-              </a:rPr>
-              <a:t>From the website: </a:t>
-            </a:r>
-            <a:br>
-              <a:rPr lang="en-US" sz="1200" b="0" i="1" kern="1200" dirty="0">
-                <a:solidFill>
-                  <a:schemeClr val="tx1"/>
-                </a:solidFill>
-                <a:effectLst/>
-                <a:latin typeface="+mn-lt"/>
-                <a:ea typeface="+mn-ea"/>
-                <a:cs typeface="+mn-cs"/>
-              </a:rPr>
-            </a:br>
-            <a:r>
-              <a:rPr lang="en-US" sz="1200" b="0" i="1" kern="1200" dirty="0">
-                <a:solidFill>
-                  <a:schemeClr val="tx1"/>
-                </a:solidFill>
-                <a:effectLst/>
-                <a:latin typeface="+mn-lt"/>
-                <a:ea typeface="+mn-ea"/>
-                <a:cs typeface="+mn-cs"/>
-              </a:rPr>
-              <a:t>The </a:t>
-            </a:r>
-            <a:r>
-              <a:rPr lang="en-US" sz="1200" b="0" i="1" kern="1200" dirty="0" err="1">
-                <a:solidFill>
-                  <a:schemeClr val="tx1"/>
-                </a:solidFill>
-                <a:effectLst/>
-                <a:latin typeface="+mn-lt"/>
-                <a:ea typeface="+mn-ea"/>
-                <a:cs typeface="+mn-cs"/>
-              </a:rPr>
-              <a:t>Trilinos</a:t>
-            </a:r>
-            <a:r>
-              <a:rPr lang="en-US" sz="1200" b="0" i="1" kern="1200" dirty="0">
-                <a:solidFill>
-                  <a:schemeClr val="tx1"/>
-                </a:solidFill>
-                <a:effectLst/>
-                <a:latin typeface="+mn-lt"/>
-                <a:ea typeface="+mn-ea"/>
-                <a:cs typeface="+mn-cs"/>
-              </a:rPr>
-              <a:t> Project is a community of developers, users and </a:t>
-            </a:r>
-            <a:r>
-              <a:rPr lang="en-US" sz="1200" b="0" i="1" u="none" strike="noStrike" kern="1200" dirty="0">
-                <a:solidFill>
-                  <a:schemeClr val="tx1"/>
-                </a:solidFill>
-                <a:effectLst/>
-                <a:latin typeface="+mn-lt"/>
-                <a:ea typeface="+mn-ea"/>
-                <a:cs typeface="+mn-cs"/>
-                <a:hlinkClick r:id="rId3"/>
-              </a:rPr>
-              <a:t>user-developers</a:t>
-            </a:r>
-            <a:r>
-              <a:rPr lang="en-US" sz="1200" b="0" i="1" kern="1200" dirty="0">
-                <a:solidFill>
-                  <a:schemeClr val="tx1"/>
-                </a:solidFill>
-                <a:effectLst/>
-                <a:latin typeface="+mn-lt"/>
-                <a:ea typeface="+mn-ea"/>
-                <a:cs typeface="+mn-cs"/>
-              </a:rPr>
-              <a:t> focused on collaborative creation of algorithms and enabling technologies within an object-oriented software framework for the solution of large-scale, complex multi-physics engineering and scientific problems on new and emerging high-performance computing (HPC) architectures.</a:t>
-            </a:r>
-          </a:p>
-          <a:p>
-            <a:br>
-              <a:rPr lang="en-US" dirty="0"/>
-            </a:br>
-            <a:r>
-              <a:rPr lang="en-US" sz="1200" b="0" i="1" kern="1200" dirty="0" err="1">
-                <a:solidFill>
-                  <a:schemeClr val="tx1"/>
-                </a:solidFill>
-                <a:effectLst/>
-                <a:latin typeface="+mn-lt"/>
-                <a:ea typeface="+mn-ea"/>
-                <a:cs typeface="+mn-cs"/>
-              </a:rPr>
-              <a:t>Trilinos</a:t>
-            </a:r>
-            <a:r>
-              <a:rPr lang="en-US" sz="1200" b="0" i="1" kern="1200" dirty="0">
-                <a:solidFill>
-                  <a:schemeClr val="tx1"/>
-                </a:solidFill>
-                <a:effectLst/>
-                <a:latin typeface="+mn-lt"/>
-                <a:ea typeface="+mn-ea"/>
-                <a:cs typeface="+mn-cs"/>
-              </a:rPr>
-              <a:t> is also a collection of reusable scientific software libraries, known in particular for </a:t>
-            </a:r>
-            <a:r>
-              <a:rPr lang="en-US" sz="1200" b="0" i="1" u="none" strike="noStrike" kern="1200" dirty="0">
-                <a:solidFill>
-                  <a:schemeClr val="tx1"/>
-                </a:solidFill>
-                <a:effectLst/>
-                <a:latin typeface="+mn-lt"/>
-                <a:ea typeface="+mn-ea"/>
-                <a:cs typeface="+mn-cs"/>
-                <a:hlinkClick r:id="rId3"/>
-              </a:rPr>
-              <a:t>linear solvers</a:t>
-            </a:r>
-            <a:r>
-              <a:rPr lang="en-US" sz="1200" b="0" i="1" kern="1200" dirty="0">
-                <a:solidFill>
-                  <a:schemeClr val="tx1"/>
-                </a:solidFill>
-                <a:effectLst/>
-                <a:latin typeface="+mn-lt"/>
-                <a:ea typeface="+mn-ea"/>
-                <a:cs typeface="+mn-cs"/>
-              </a:rPr>
-              <a:t>, </a:t>
-            </a:r>
-            <a:r>
-              <a:rPr lang="en-US" sz="1200" b="0" i="1" u="none" strike="noStrike" kern="1200" dirty="0">
-                <a:solidFill>
-                  <a:schemeClr val="tx1"/>
-                </a:solidFill>
-                <a:effectLst/>
-                <a:latin typeface="+mn-lt"/>
-                <a:ea typeface="+mn-ea"/>
-                <a:cs typeface="+mn-cs"/>
-                <a:hlinkClick r:id="rId3"/>
-              </a:rPr>
-              <a:t>non-linear solvers</a:t>
-            </a:r>
-            <a:r>
-              <a:rPr lang="en-US" sz="1200" b="0" i="1" kern="1200" dirty="0">
-                <a:solidFill>
-                  <a:schemeClr val="tx1"/>
-                </a:solidFill>
-                <a:effectLst/>
-                <a:latin typeface="+mn-lt"/>
-                <a:ea typeface="+mn-ea"/>
-                <a:cs typeface="+mn-cs"/>
-              </a:rPr>
-              <a:t>, </a:t>
-            </a:r>
-            <a:r>
-              <a:rPr lang="en-US" sz="1200" b="0" i="1" u="none" strike="noStrike" kern="1200" dirty="0">
-                <a:solidFill>
-                  <a:schemeClr val="tx1"/>
-                </a:solidFill>
-                <a:effectLst/>
-                <a:latin typeface="+mn-lt"/>
-                <a:ea typeface="+mn-ea"/>
-                <a:cs typeface="+mn-cs"/>
-                <a:hlinkClick r:id="rId3"/>
-              </a:rPr>
-              <a:t>transient solvers</a:t>
-            </a:r>
-            <a:r>
-              <a:rPr lang="en-US" sz="1200" b="0" i="1" kern="1200" dirty="0">
-                <a:solidFill>
-                  <a:schemeClr val="tx1"/>
-                </a:solidFill>
-                <a:effectLst/>
-                <a:latin typeface="+mn-lt"/>
-                <a:ea typeface="+mn-ea"/>
-                <a:cs typeface="+mn-cs"/>
-              </a:rPr>
-              <a:t>, </a:t>
-            </a:r>
-            <a:r>
-              <a:rPr lang="en-US" sz="1200" b="0" i="1" u="none" strike="noStrike" kern="1200" dirty="0">
-                <a:solidFill>
-                  <a:schemeClr val="tx1"/>
-                </a:solidFill>
-                <a:effectLst/>
-                <a:latin typeface="+mn-lt"/>
-                <a:ea typeface="+mn-ea"/>
-                <a:cs typeface="+mn-cs"/>
-                <a:hlinkClick r:id="rId3"/>
-              </a:rPr>
-              <a:t>optimization solvers</a:t>
-            </a:r>
-            <a:r>
-              <a:rPr lang="en-US" sz="1200" b="0" i="1" kern="1200" dirty="0">
-                <a:solidFill>
-                  <a:schemeClr val="tx1"/>
-                </a:solidFill>
-                <a:effectLst/>
-                <a:latin typeface="+mn-lt"/>
-                <a:ea typeface="+mn-ea"/>
-                <a:cs typeface="+mn-cs"/>
-              </a:rPr>
-              <a:t>, and </a:t>
-            </a:r>
-            <a:r>
-              <a:rPr lang="en-US" sz="1200" b="0" i="1" u="none" strike="noStrike" kern="1200" dirty="0">
-                <a:solidFill>
-                  <a:schemeClr val="tx1"/>
-                </a:solidFill>
-                <a:effectLst/>
-                <a:latin typeface="+mn-lt"/>
-                <a:ea typeface="+mn-ea"/>
-                <a:cs typeface="+mn-cs"/>
-                <a:hlinkClick r:id="rId3"/>
-              </a:rPr>
-              <a:t>uncertainty quantification (UQ) solvers</a:t>
-            </a:r>
-            <a:r>
-              <a:rPr lang="en-US" sz="1200" b="0" i="1" kern="1200" dirty="0">
-                <a:solidFill>
-                  <a:schemeClr val="tx1"/>
-                </a:solidFill>
-                <a:effectLst/>
-                <a:latin typeface="+mn-lt"/>
-                <a:ea typeface="+mn-ea"/>
-                <a:cs typeface="+mn-cs"/>
-              </a:rPr>
-              <a:t>.</a:t>
-            </a:r>
-          </a:p>
-          <a:p>
-            <a:br>
-              <a:rPr lang="en-US" dirty="0"/>
-            </a:br>
             <a:endParaRPr lang="en-US" dirty="0"/>
           </a:p>
         </p:txBody>
@@ -1707,7 +1464,7 @@
           <a:p>
             <a:fld id="{54E672D7-8E2D-4611-973D-F4591A707C34}" type="slidenum">
               <a:rPr lang="en-US" smtClean="0"/>
-              <a:t>21</a:t>
+              <a:t>19</a:t>
             </a:fld>
             <a:endParaRPr lang="en-US"/>
           </a:p>
@@ -1716,7 +1473,7 @@
     </p:spTree>
     <p:extLst>
       <p:ext uri="{BB962C8B-B14F-4D97-AF65-F5344CB8AC3E}">
-        <p14:creationId xmlns:p14="http://schemas.microsoft.com/office/powerpoint/2010/main" val="2902190238"/>
+        <p14:creationId xmlns:p14="http://schemas.microsoft.com/office/powerpoint/2010/main" val="3622371461"/>
       </p:ext>
     </p:extLst>
   </p:cSld>
@@ -1770,25 +1527,8 @@
           <a:bodyPr/>
           <a:lstStyle/>
           <a:p>
-            <a:pPr marL="0" marR="0" lvl="0" indent="0" algn="l" defTabSz="914400" rtl="0" eaLnBrk="1" fontAlgn="auto" latinLnBrk="0" hangingPunct="1">
-              <a:lnSpc>
-                <a:spcPct val="100000"/>
-              </a:lnSpc>
-              <a:spcBef>
-                <a:spcPts val="0"/>
-              </a:spcBef>
-              <a:spcAft>
-                <a:spcPts val="0"/>
-              </a:spcAft>
-              <a:buClrTx/>
-              <a:buSzTx/>
-              <a:buFontTx/>
-              <a:buNone/>
-              <a:tabLst/>
-              <a:defRPr/>
-            </a:pPr>
-            <a:r>
-              <a:rPr lang="en-US" sz="1200" b="1" i="0" kern="1200" dirty="0">
+            <a:r>
+              <a:rPr lang="en-US" sz="1200" b="0" i="1" kern="1200" dirty="0">
                 <a:solidFill>
                   <a:schemeClr val="tx1"/>
                 </a:solidFill>
@@ -1797,10 +1537,239 @@
                 <a:ea typeface="+mn-ea"/>
                 <a:cs typeface="+mn-cs"/>
               </a:rPr>
-              <a:t>A High Performance Message Passing Library</a:t>
-            </a:r>
-          </a:p>
-          <a:p>
+              <a:t>From the website: </a:t>
+            </a:r>
+            <a:br>
+              <a:rPr lang="en-US" sz="1200" b="0" i="1" kern="1200" dirty="0">
+                <a:solidFill>
+                  <a:schemeClr val="tx1"/>
+                </a:solidFill>
+                <a:effectLst/>
+                <a:latin typeface="+mn-lt"/>
+                <a:ea typeface="+mn-ea"/>
+                <a:cs typeface="+mn-cs"/>
+              </a:rPr>
+            </a:br>
+            <a:r>
+              <a:rPr lang="en-US" sz="1200" b="0" i="1" kern="1200" dirty="0">
+                <a:solidFill>
+                  <a:schemeClr val="tx1"/>
+                </a:solidFill>
+                <a:effectLst/>
+                <a:latin typeface="+mn-lt"/>
+                <a:ea typeface="+mn-ea"/>
+                <a:cs typeface="+mn-cs"/>
+              </a:rPr>
+              <a:t>The </a:t>
+            </a:r>
+            <a:r>
+              <a:rPr lang="en-US" sz="1200" b="0" i="1" kern="1200" dirty="0" err="1">
+                <a:solidFill>
+                  <a:schemeClr val="tx1"/>
+                </a:solidFill>
+                <a:effectLst/>
+                <a:latin typeface="+mn-lt"/>
+                <a:ea typeface="+mn-ea"/>
+                <a:cs typeface="+mn-cs"/>
+              </a:rPr>
+              <a:t>Trilinos</a:t>
+            </a:r>
+            <a:r>
+              <a:rPr lang="en-US" sz="1200" b="0" i="1" kern="1200" dirty="0">
+                <a:solidFill>
+                  <a:schemeClr val="tx1"/>
+                </a:solidFill>
+                <a:effectLst/>
+                <a:latin typeface="+mn-lt"/>
+                <a:ea typeface="+mn-ea"/>
+                <a:cs typeface="+mn-cs"/>
+              </a:rPr>
+              <a:t> Project is a community of developers, users and </a:t>
+            </a:r>
+            <a:r>
+              <a:rPr lang="en-US" sz="1200" b="0" i="1" u="none" strike="noStrike" kern="1200" dirty="0">
+                <a:solidFill>
+                  <a:schemeClr val="tx1"/>
+                </a:solidFill>
+                <a:effectLst/>
+                <a:latin typeface="+mn-lt"/>
+                <a:ea typeface="+mn-ea"/>
+                <a:cs typeface="+mn-cs"/>
+                <a:hlinkClick r:id="rId3"/>
+              </a:rPr>
+              <a:t>user-developers</a:t>
+            </a:r>
+            <a:r>
+              <a:rPr lang="en-US" sz="1200" b="0" i="1" kern="1200" dirty="0">
+                <a:solidFill>
+                  <a:schemeClr val="tx1"/>
+                </a:solidFill>
+                <a:effectLst/>
+                <a:latin typeface="+mn-lt"/>
+                <a:ea typeface="+mn-ea"/>
+                <a:cs typeface="+mn-cs"/>
+              </a:rPr>
+              <a:t> focused on collaborative creation of algorithms and enabling technologies within an object-oriented software framework for the solution of large-scale, complex multi-physics engineering and scientific problems on new and emerging high-performance computing (HPC) architectures.</a:t>
+            </a:r>
+          </a:p>
+          <a:p>
+            <a:br>
+              <a:rPr lang="en-US" dirty="0"/>
+            </a:br>
+            <a:r>
+              <a:rPr lang="en-US" sz="1200" b="0" i="1" kern="1200" dirty="0" err="1">
+                <a:solidFill>
+                  <a:schemeClr val="tx1"/>
+                </a:solidFill>
+                <a:effectLst/>
+                <a:latin typeface="+mn-lt"/>
+                <a:ea typeface="+mn-ea"/>
+                <a:cs typeface="+mn-cs"/>
+              </a:rPr>
+              <a:t>Trilinos</a:t>
+            </a:r>
+            <a:r>
+              <a:rPr lang="en-US" sz="1200" b="0" i="1" kern="1200" dirty="0">
+                <a:solidFill>
+                  <a:schemeClr val="tx1"/>
+                </a:solidFill>
+                <a:effectLst/>
+                <a:latin typeface="+mn-lt"/>
+                <a:ea typeface="+mn-ea"/>
+                <a:cs typeface="+mn-cs"/>
+              </a:rPr>
+              <a:t> is also a collection of reusable scientific software libraries, known in particular for </a:t>
+            </a:r>
+            <a:r>
+              <a:rPr lang="en-US" sz="1200" b="0" i="1" u="none" strike="noStrike" kern="1200" dirty="0">
+                <a:solidFill>
+                  <a:schemeClr val="tx1"/>
+                </a:solidFill>
+                <a:effectLst/>
+                <a:latin typeface="+mn-lt"/>
+                <a:ea typeface="+mn-ea"/>
+                <a:cs typeface="+mn-cs"/>
+                <a:hlinkClick r:id="rId3"/>
+              </a:rPr>
+              <a:t>linear solvers</a:t>
+            </a:r>
+            <a:r>
+              <a:rPr lang="en-US" sz="1200" b="0" i="1" kern="1200" dirty="0">
+                <a:solidFill>
+                  <a:schemeClr val="tx1"/>
+                </a:solidFill>
+                <a:effectLst/>
+                <a:latin typeface="+mn-lt"/>
+                <a:ea typeface="+mn-ea"/>
+                <a:cs typeface="+mn-cs"/>
+              </a:rPr>
+              <a:t>, </a:t>
+            </a:r>
+            <a:r>
+              <a:rPr lang="en-US" sz="1200" b="0" i="1" u="none" strike="noStrike" kern="1200" dirty="0">
+                <a:solidFill>
+                  <a:schemeClr val="tx1"/>
+                </a:solidFill>
+                <a:effectLst/>
+                <a:latin typeface="+mn-lt"/>
+                <a:ea typeface="+mn-ea"/>
+                <a:cs typeface="+mn-cs"/>
+                <a:hlinkClick r:id="rId3"/>
+              </a:rPr>
+              <a:t>non-linear solvers</a:t>
+            </a:r>
+            <a:r>
+              <a:rPr lang="en-US" sz="1200" b="0" i="1" kern="1200" dirty="0">
+                <a:solidFill>
+                  <a:schemeClr val="tx1"/>
+                </a:solidFill>
+                <a:effectLst/>
+                <a:latin typeface="+mn-lt"/>
+                <a:ea typeface="+mn-ea"/>
+                <a:cs typeface="+mn-cs"/>
+              </a:rPr>
+              <a:t>, </a:t>
+            </a:r>
+            <a:r>
+              <a:rPr lang="en-US" sz="1200" b="0" i="1" u="none" strike="noStrike" kern="1200" dirty="0">
+                <a:solidFill>
+                  <a:schemeClr val="tx1"/>
+                </a:solidFill>
+                <a:effectLst/>
+                <a:latin typeface="+mn-lt"/>
+                <a:ea typeface="+mn-ea"/>
+                <a:cs typeface="+mn-cs"/>
+                <a:hlinkClick r:id="rId3"/>
+              </a:rPr>
+              <a:t>transient solvers</a:t>
+            </a:r>
+            <a:r>
+              <a:rPr lang="en-US" sz="1200" b="0" i="1" kern="1200" dirty="0">
+                <a:solidFill>
+                  <a:schemeClr val="tx1"/>
+                </a:solidFill>
+                <a:effectLst/>
+                <a:latin typeface="+mn-lt"/>
+                <a:ea typeface="+mn-ea"/>
+                <a:cs typeface="+mn-cs"/>
+              </a:rPr>
+              <a:t>, </a:t>
+            </a:r>
+            <a:r>
+              <a:rPr lang="en-US" sz="1200" b="0" i="1" u="none" strike="noStrike" kern="1200" dirty="0">
+                <a:solidFill>
+                  <a:schemeClr val="tx1"/>
+                </a:solidFill>
+                <a:effectLst/>
+                <a:latin typeface="+mn-lt"/>
+                <a:ea typeface="+mn-ea"/>
+                <a:cs typeface="+mn-cs"/>
+                <a:hlinkClick r:id="rId3"/>
+              </a:rPr>
+              <a:t>optimization solvers</a:t>
+            </a:r>
+            <a:r>
+              <a:rPr lang="en-US" sz="1200" b="0" i="1" kern="1200" dirty="0">
+                <a:solidFill>
+                  <a:schemeClr val="tx1"/>
+                </a:solidFill>
+                <a:effectLst/>
+                <a:latin typeface="+mn-lt"/>
+                <a:ea typeface="+mn-ea"/>
+                <a:cs typeface="+mn-cs"/>
+              </a:rPr>
+              <a:t>, and </a:t>
+            </a:r>
+            <a:r>
+              <a:rPr lang="en-US" sz="1200" b="0" i="1" u="none" strike="noStrike" kern="1200" dirty="0">
+                <a:solidFill>
+                  <a:schemeClr val="tx1"/>
+                </a:solidFill>
+                <a:effectLst/>
+                <a:latin typeface="+mn-lt"/>
+                <a:ea typeface="+mn-ea"/>
+                <a:cs typeface="+mn-cs"/>
+                <a:hlinkClick r:id="rId3"/>
+              </a:rPr>
+              <a:t>uncertainty quantification (UQ) solvers</a:t>
+            </a:r>
+            <a:r>
+              <a:rPr lang="en-US" sz="1200" b="0" i="1" kern="1200" dirty="0">
+                <a:solidFill>
+                  <a:schemeClr val="tx1"/>
+                </a:solidFill>
+                <a:effectLst/>
+                <a:latin typeface="+mn-lt"/>
+                <a:ea typeface="+mn-ea"/>
+                <a:cs typeface="+mn-cs"/>
+              </a:rPr>
+              <a:t>.</a:t>
+            </a:r>
+          </a:p>
+          <a:p>
+            <a:br>
+              <a:rPr lang="en-US" dirty="0"/>
+            </a:br>
             <a:endParaRPr lang="en-US" dirty="0"/>
           </a:p>
         </p:txBody>
@@ -1822,7 +1791,7 @@
           <a:p>
             <a:fld id="{54E672D7-8E2D-4611-973D-F4591A707C34}" type="slidenum">
               <a:rPr lang="en-US" smtClean="0"/>
-              <a:t>22</a:t>
+              <a:t>21</a:t>
             </a:fld>
             <a:endParaRPr lang="en-US"/>
           </a:p>
@@ -1831,7 +1800,7 @@
     </p:spTree>
     <p:extLst>
       <p:ext uri="{BB962C8B-B14F-4D97-AF65-F5344CB8AC3E}">
-        <p14:creationId xmlns:p14="http://schemas.microsoft.com/office/powerpoint/2010/main" val="2825016049"/>
+        <p14:creationId xmlns:p14="http://schemas.microsoft.com/office/powerpoint/2010/main" val="2902190238"/>
       </p:ext>
     </p:extLst>
   </p:cSld>
@@ -1885,8 +1854,25 @@
           <a:bodyPr/>
           <a:lstStyle/>
           <a:p>
-            <a:r>
-              <a:rPr lang="en-US" sz="1200" b="0" i="0" kern="1200" dirty="0" err="1">
+            <a:pPr marL="0" marR="0" lvl="0" indent="0" algn="l" defTabSz="914400" rtl="0" eaLnBrk="1" fontAlgn="auto" latinLnBrk="0" hangingPunct="1">
+              <a:lnSpc>
+                <a:spcPct val="100000"/>
+              </a:lnSpc>
+              <a:spcBef>
+                <a:spcPts val="0"/>
+              </a:spcBef>
+              <a:spcAft>
+                <a:spcPts val="0"/>
+              </a:spcAft>
+              <a:buClrTx/>
+              <a:buSzTx/>
+              <a:buFontTx/>
+              <a:buNone/>
+              <a:tabLst/>
+              <a:defRPr/>
+            </a:pPr>
+            <a:r>
+              <a:rPr lang="en-US" sz="1200" b="1" i="0" kern="1200" dirty="0">
                 <a:solidFill>
                   <a:schemeClr val="tx1"/>
                 </a:solidFill>
@@ -1895,34 +1881,10 @@
                 <a:ea typeface="+mn-ea"/>
                 <a:cs typeface="+mn-cs"/>
               </a:rPr>
-              <a:t>FleCSI</a:t>
-            </a:r>
-            <a:r>
-              <a:rPr lang="en-US" sz="1200" b="0" i="0" kern="1200" dirty="0">
-                <a:solidFill>
-                  <a:schemeClr val="tx1"/>
-                </a:solidFill>
-                <a:effectLst/>
-                <a:latin typeface="+mn-lt"/>
-                <a:ea typeface="+mn-ea"/>
-                <a:cs typeface="+mn-cs"/>
-              </a:rPr>
-              <a:t> is a compile-time configurable framework designed to support multi-physics application development for current and emerging HPC systems.</a:t>
-            </a:r>
-          </a:p>
-          <a:p>
-            <a:r>
-              <a:rPr lang="en-US" sz="1200" b="0" i="0" kern="1200" dirty="0">
-                <a:solidFill>
-                  <a:schemeClr val="tx1"/>
-                </a:solidFill>
-                <a:effectLst/>
-                <a:latin typeface="+mn-lt"/>
-                <a:ea typeface="+mn-ea"/>
-                <a:cs typeface="+mn-cs"/>
-              </a:rPr>
-              <a:t>In the diagram there is a 1.x branch only for new releases,  an initial 1.0 release branch with tag 1.0.0 as the initial release and tags 1.0.1, 1.0.2 for bug fixes, when 1.1 feature is release again an initial tag 1.1.0, then bug fix release tags 1.1.1 &amp; 1.1.2 etc. Once a major version goes into maintenance mode and a new major feature branch begins; in this case 2.x and like branches and tags are created for 2.x </a:t>
-            </a:r>
+              <a:t>A High Performance Message Passing Library</a:t>
+            </a:r>
+          </a:p>
+          <a:p>
             <a:endParaRPr lang="en-US" dirty="0"/>
           </a:p>
         </p:txBody>
@@ -1944,7 +1906,7 @@
           <a:p>
             <a:fld id="{54E672D7-8E2D-4611-973D-F4591A707C34}" type="slidenum">
               <a:rPr lang="en-US" smtClean="0"/>
-              <a:t>23</a:t>
+              <a:t>22</a:t>
             </a:fld>
             <a:endParaRPr lang="en-US"/>
           </a:p>
@@ -1953,7 +1915,7 @@
     </p:spTree>
     <p:extLst>
       <p:ext uri="{BB962C8B-B14F-4D97-AF65-F5344CB8AC3E}">
-        <p14:creationId xmlns:p14="http://schemas.microsoft.com/office/powerpoint/2010/main" val="3016390096"/>
+        <p14:creationId xmlns:p14="http://schemas.microsoft.com/office/powerpoint/2010/main" val="2825016049"/>
       </p:ext>
     </p:extLst>
   </p:cSld>
@@ -2091,6 +2053,128 @@
           <a:bodyPr/>
           <a:lstStyle/>
           <a:p>
+            <a:r>
+              <a:rPr lang="en-US" sz="1200" b="0" i="0" kern="1200" dirty="0" err="1">
+                <a:solidFill>
+                  <a:schemeClr val="tx1"/>
+                </a:solidFill>
+                <a:effectLst/>
+                <a:latin typeface="+mn-lt"/>
+                <a:ea typeface="+mn-ea"/>
+                <a:cs typeface="+mn-cs"/>
+              </a:rPr>
+              <a:t>FleCSI</a:t>
+            </a:r>
+            <a:r>
+              <a:rPr lang="en-US" sz="1200" b="0" i="0" kern="1200" dirty="0">
+                <a:solidFill>
+                  <a:schemeClr val="tx1"/>
+                </a:solidFill>
+                <a:effectLst/>
+                <a:latin typeface="+mn-lt"/>
+                <a:ea typeface="+mn-ea"/>
+                <a:cs typeface="+mn-cs"/>
+              </a:rPr>
+              <a:t> is a compile-time configurable framework designed to support multi-physics application development for current and emerging HPC systems.</a:t>
+            </a:r>
+          </a:p>
+          <a:p>
+            <a:r>
+              <a:rPr lang="en-US" sz="1200" b="0" i="0" kern="1200" dirty="0">
+                <a:solidFill>
+                  <a:schemeClr val="tx1"/>
+                </a:solidFill>
+                <a:effectLst/>
+                <a:latin typeface="+mn-lt"/>
+                <a:ea typeface="+mn-ea"/>
+                <a:cs typeface="+mn-cs"/>
+              </a:rPr>
+              <a:t>In the diagram there is a 1.x branch only for new releases,  an initial 1.0 release branch with tag 1.0.0 as the initial release and tags 1.0.1, 1.0.2 for bug fixes, when 1.1 feature is release again an initial tag 1.1.0, then bug fix release tags 1.1.1 &amp; 1.1.2 etc. Once a major version goes into maintenance mode and a new major feature branch begins; in this case 2.x and like branches and tags are created for 2.x </a:t>
+            </a:r>
+            <a:endParaRPr lang="en-US" dirty="0"/>
+          </a:p>
+        </p:txBody>
+      </p:sp>
+      <p:sp>
+        <p:nvSpPr>
+          <p:cNvPr id="4" name="Slide Number Placeholder 3"/>
+          <p:cNvSpPr>
+            <a:spLocks noGrp="1"/>
+          </p:cNvSpPr>
+          <p:nvPr>
+            <p:ph type="sldNum" sz="quarter" idx="10"/>
+          </p:nvPr>
+        </p:nvSpPr>
+        <p:spPr/>
+        <p:txBody>
+          <a:bodyPr/>
+          <a:lstStyle/>
+          <a:p>
+            <a:fld id="{54E672D7-8E2D-4611-973D-F4591A707C34}" type="slidenum">
+              <a:rPr lang="en-US" smtClean="0"/>
+              <a:t>23</a:t>
+            </a:fld>
+            <a:endParaRPr lang="en-US"/>
+          </a:p>
+        </p:txBody>
+      </p:sp>
+    </p:spTree>
+    <p:extLst>
+      <p:ext uri="{BB962C8B-B14F-4D97-AF65-F5344CB8AC3E}">
+        <p14:creationId xmlns:p14="http://schemas.microsoft.com/office/powerpoint/2010/main" val="3016390096"/>
+      </p:ext>
+    </p:extLst>
+  </p:cSld>
+  <p:clrMapOvr>
+    <a:masterClrMapping/>
+  </p:clrMapOvr>
+</p:notes>
+</file>
+
+<file path=ppt/notesSlides/notesSlide21.xml><?xml version="1.0" encoding="utf-8"?>
+<p:notes xmlns:a="http://schemas.openxmlformats.org/drawingml/2006/main" xmlns:r="http://schemas.openxmlformats.org/officeDocument/2006/relationships" xmlns:p="http://schemas.openxmlformats.org/presentationml/2006/main">
+  <p:cSld>
+    <p:spTree>
+      <p:nvGrpSpPr>
+        <p:cNvPr id="1" name=""/>
+        <p:cNvGrpSpPr/>
+        <p:nvPr/>
+      </p:nvGrpSpPr>
+      <p:grpSpPr>
+        <a:xfrm>
+          <a:off x="0" y="0"/>
+          <a:ext cx="0" cy="0"/>
+          <a:chOff x="0" y="0"/>
+          <a:chExt cx="0" cy="0"/>
+        </a:xfrm>
+      </p:grpSpPr>
+      <p:sp>
+        <p:nvSpPr>
+          <p:cNvPr id="2" name="Slide Image Placeholder 1"/>
+          <p:cNvSpPr>
+            <a:spLocks noGrp="1" noRot="1" noChangeAspect="1"/>
+          </p:cNvSpPr>
+          <p:nvPr>
+            <p:ph type="sldImg"/>
+          </p:nvPr>
+        </p:nvSpPr>
+        <p:spPr/>
+      </p:sp>
+      <p:sp>
+        <p:nvSpPr>
+          <p:cNvPr id="3" name="Notes Placeholder 2"/>
+          <p:cNvSpPr>
+            <a:spLocks noGrp="1"/>
+          </p:cNvSpPr>
+          <p:nvPr>
+            <p:ph type="body" idx="1"/>
+          </p:nvPr>
+        </p:nvSpPr>
+        <p:spPr/>
+        <p:txBody>
+          <a:bodyPr/>
+          <a:lstStyle/>
+          <a:p>
             <a:endParaRPr lang="en-US" dirty="0"/>
           </a:p>
         </p:txBody>
@@ -2175,7 +2259,35 @@
           <a:bodyPr/>
           <a:lstStyle/>
           <a:p>
+            <a:pPr marL="0" marR="0" lvl="0" indent="0" algn="l" defTabSz="914400" rtl="0" eaLnBrk="1" fontAlgn="auto" latinLnBrk="0" hangingPunct="1">
+              <a:lnSpc>
+                <a:spcPct val="100000"/>
+              </a:lnSpc>
+              <a:spcBef>
+                <a:spcPts val="0"/>
+              </a:spcBef>
+              <a:spcAft>
+                <a:spcPts val="0"/>
+              </a:spcAft>
+              <a:buClrTx/>
+              <a:buSzTx/>
+              <a:buFontTx/>
+              <a:buNone/>
+              <a:tabLst/>
+              <a:defRPr/>
+            </a:pPr>
+            <a:r>
+              <a:rPr lang="en-US" b="1" dirty="0"/>
+              <a:t>Note: Although you may go to the references from this talk that still use master we have replaced the term </a:t>
+            </a:r>
+            <a:r>
+              <a:rPr lang="en-US" b="1"/>
+              <a:t>with main.</a:t>
+            </a:r>
             <a:endParaRPr lang="en-US" b="1" dirty="0"/>
+          </a:p>
+          <a:p>
+            <a:endParaRPr lang="en-US" dirty="0"/>
           </a:p>
         </p:txBody>
       </p:sp>
@@ -2196,7 +2308,7 @@
           <a:p>
             <a:fld id="{54E672D7-8E2D-4611-973D-F4591A707C34}" type="slidenum">
               <a:rPr lang="en-US" smtClean="0"/>
-              <a:t>5</a:t>
+              <a:t>4</a:t>
             </a:fld>
             <a:endParaRPr lang="en-US"/>
           </a:p>
@@ -2205,7 +2317,7 @@
     </p:spTree>
     <p:extLst>
       <p:ext uri="{BB962C8B-B14F-4D97-AF65-F5344CB8AC3E}">
-        <p14:creationId xmlns:p14="http://schemas.microsoft.com/office/powerpoint/2010/main" val="3413212601"/>
+        <p14:creationId xmlns:p14="http://schemas.microsoft.com/office/powerpoint/2010/main" val="1340946256"/>
       </p:ext>
     </p:extLst>
   </p:cSld>
@@ -2259,7 +2371,7 @@
           <a:bodyPr/>
           <a:lstStyle/>
           <a:p>
-            <a:endParaRPr lang="en-US" dirty="0"/>
+            <a:endParaRPr lang="en-US" b="1" dirty="0"/>
           </a:p>
         </p:txBody>
       </p:sp>
@@ -2270,7 +2382,7 @@
             <a:spLocks noGrp="1"/>
           </p:cNvSpPr>
           <p:nvPr>
-            <p:ph type="sldNum" sz="quarter" idx="10"/>
+            <p:ph type="sldNum" sz="quarter" idx="5"/>
           </p:nvPr>
         </p:nvSpPr>
         <p:spPr/>
@@ -2280,7 +2392,7 @@
           <a:p>
             <a:fld id="{54E672D7-8E2D-4611-973D-F4591A707C34}" type="slidenum">
               <a:rPr lang="en-US" smtClean="0"/>
-              <a:t>6</a:t>
+              <a:t>5</a:t>
             </a:fld>
             <a:endParaRPr lang="en-US"/>
           </a:p>
@@ -2289,7 +2401,7 @@
     </p:spTree>
     <p:extLst>
       <p:ext uri="{BB962C8B-B14F-4D97-AF65-F5344CB8AC3E}">
-        <p14:creationId xmlns:p14="http://schemas.microsoft.com/office/powerpoint/2010/main" val="1996617285"/>
+        <p14:creationId xmlns:p14="http://schemas.microsoft.com/office/powerpoint/2010/main" val="3413212601"/>
       </p:ext>
     </p:extLst>
   </p:cSld>
@@ -2354,7 +2466,7 @@
             <a:spLocks noGrp="1"/>
           </p:cNvSpPr>
           <p:nvPr>
-            <p:ph type="sldNum" sz="quarter" idx="5"/>
+            <p:ph type="sldNum" sz="quarter" idx="10"/>
           </p:nvPr>
         </p:nvSpPr>
         <p:spPr/>
@@ -2364,7 +2476,7 @@
           <a:p>
             <a:fld id="{54E672D7-8E2D-4611-973D-F4591A707C34}" type="slidenum">
               <a:rPr lang="en-US" smtClean="0"/>
-              <a:t>7</a:t>
+              <a:t>6</a:t>
             </a:fld>
             <a:endParaRPr lang="en-US"/>
           </a:p>
@@ -2373,7 +2485,7 @@
     </p:spTree>
     <p:extLst>
       <p:ext uri="{BB962C8B-B14F-4D97-AF65-F5344CB8AC3E}">
-        <p14:creationId xmlns:p14="http://schemas.microsoft.com/office/powerpoint/2010/main" val="813827686"/>
+        <p14:creationId xmlns:p14="http://schemas.microsoft.com/office/powerpoint/2010/main" val="1996617285"/>
       </p:ext>
     </p:extLst>
   </p:cSld>
@@ -2427,7 +2539,7 @@
           <a:bodyPr/>
           <a:lstStyle/>
           <a:p>
-            <a:endParaRPr lang="en-US" b="1" dirty="0"/>
+            <a:endParaRPr lang="en-US" dirty="0"/>
           </a:p>
         </p:txBody>
       </p:sp>
@@ -2438,7 +2550,7 @@
             <a:spLocks noGrp="1"/>
           </p:cNvSpPr>
           <p:nvPr>
-            <p:ph type="sldNum" sz="quarter" idx="10"/>
+            <p:ph type="sldNum" sz="quarter" idx="5"/>
           </p:nvPr>
         </p:nvSpPr>
         <p:spPr/>
@@ -2448,7 +2560,7 @@
           <a:p>
             <a:fld id="{54E672D7-8E2D-4611-973D-F4591A707C34}" type="slidenum">
               <a:rPr lang="en-US" smtClean="0"/>
-              <a:t>8</a:t>
+              <a:t>7</a:t>
             </a:fld>
             <a:endParaRPr lang="en-US"/>
           </a:p>
@@ -2457,7 +2569,7 @@
     </p:spTree>
     <p:extLst>
       <p:ext uri="{BB962C8B-B14F-4D97-AF65-F5344CB8AC3E}">
-        <p14:creationId xmlns:p14="http://schemas.microsoft.com/office/powerpoint/2010/main" val="468792164"/>
+        <p14:creationId xmlns:p14="http://schemas.microsoft.com/office/powerpoint/2010/main" val="813827686"/>
       </p:ext>
     </p:extLst>
   </p:cSld>
@@ -2511,7 +2623,7 @@
           <a:bodyPr/>
           <a:lstStyle/>
           <a:p>
-            <a:endParaRPr lang="en-US" dirty="0"/>
+            <a:endParaRPr lang="en-US" b="1" dirty="0"/>
           </a:p>
         </p:txBody>
       </p:sp>
@@ -2532,7 +2644,7 @@
           <a:p>
             <a:fld id="{54E672D7-8E2D-4611-973D-F4591A707C34}" type="slidenum">
               <a:rPr lang="en-US" smtClean="0"/>
-              <a:t>9</a:t>
+              <a:t>8</a:t>
             </a:fld>
             <a:endParaRPr lang="en-US"/>
           </a:p>
@@ -2541,7 +2653,7 @@
     </p:spTree>
     <p:extLst>
       <p:ext uri="{BB962C8B-B14F-4D97-AF65-F5344CB8AC3E}">
-        <p14:creationId xmlns:p14="http://schemas.microsoft.com/office/powerpoint/2010/main" val="4199176634"/>
+        <p14:creationId xmlns:p14="http://schemas.microsoft.com/office/powerpoint/2010/main" val="468792164"/>
       </p:ext>
     </p:extLst>
   </p:cSld>
@@ -2595,23 +2707,6 @@
           <a:bodyPr/>
           <a:lstStyle/>
           <a:p>
-            <a:pPr marL="0" marR="0" lvl="0" indent="0" algn="l" defTabSz="914400" rtl="0" eaLnBrk="1" fontAlgn="auto" latinLnBrk="0" hangingPunct="1">
-              <a:lnSpc>
-                <a:spcPct val="100000"/>
-              </a:lnSpc>
-              <a:spcBef>
-                <a:spcPts val="0"/>
-              </a:spcBef>
-              <a:spcAft>
-                <a:spcPts val="0"/>
-              </a:spcAft>
-              <a:buClrTx/>
-              <a:buSzTx/>
-              <a:buFontTx/>
-              <a:buNone/>
-              <a:tabLst/>
-              <a:defRPr/>
-            </a:pPr>
             <a:endParaRPr lang="en-US" dirty="0"/>
           </a:p>
         </p:txBody>
@@ -2633,7 +2728,7 @@
           <a:p>
             <a:fld id="{54E672D7-8E2D-4611-973D-F4591A707C34}" type="slidenum">
               <a:rPr lang="en-US" smtClean="0"/>
-              <a:t>10</a:t>
+              <a:t>9</a:t>
             </a:fld>
             <a:endParaRPr lang="en-US"/>
           </a:p>
@@ -2642,7 +2737,7 @@
     </p:spTree>
     <p:extLst>
       <p:ext uri="{BB962C8B-B14F-4D97-AF65-F5344CB8AC3E}">
-        <p14:creationId xmlns:p14="http://schemas.microsoft.com/office/powerpoint/2010/main" val="3744654501"/>
+        <p14:creationId xmlns:p14="http://schemas.microsoft.com/office/powerpoint/2010/main" val="4199176634"/>
       </p:ext>
     </p:extLst>
   </p:cSld>
@@ -2696,6 +2791,23 @@
           <a:bodyPr/>
           <a:lstStyle/>
           <a:p>
+            <a:pPr marL="0" marR="0" lvl="0" indent="0" algn="l" defTabSz="914400" rtl="0" eaLnBrk="1" fontAlgn="auto" latinLnBrk="0" hangingPunct="1">
+              <a:lnSpc>
+                <a:spcPct val="100000"/>
+              </a:lnSpc>
+              <a:spcBef>
+                <a:spcPts val="0"/>
+              </a:spcBef>
+              <a:spcAft>
+                <a:spcPts val="0"/>
+              </a:spcAft>
+              <a:buClrTx/>
+              <a:buSzTx/>
+              <a:buFontTx/>
+              <a:buNone/>
+              <a:tabLst/>
+              <a:defRPr/>
+            </a:pPr>
             <a:endParaRPr lang="en-US" dirty="0"/>
           </a:p>
         </p:txBody>
@@ -2717,7 +2829,7 @@
           <a:p>
             <a:fld id="{54E672D7-8E2D-4611-973D-F4591A707C34}" type="slidenum">
               <a:rPr lang="en-US" smtClean="0"/>
-              <a:t>11</a:t>
+              <a:t>10</a:t>
             </a:fld>
             <a:endParaRPr lang="en-US"/>
           </a:p>
@@ -2726,7 +2838,7 @@
     </p:spTree>
     <p:extLst>
       <p:ext uri="{BB962C8B-B14F-4D97-AF65-F5344CB8AC3E}">
-        <p14:creationId xmlns:p14="http://schemas.microsoft.com/office/powerpoint/2010/main" val="3475076490"/>
+        <p14:creationId xmlns:p14="http://schemas.microsoft.com/office/powerpoint/2010/main" val="3744654501"/>
       </p:ext>
     </p:extLst>
   </p:cSld>
@@ -7547,7 +7659,7 @@
             <a:pPr lvl="1"/>
             <a:r>
               <a:rPr lang="en-US" dirty="0"/>
-              <a:t>Alerts others about changes in branch before merge</a:t>
+              <a:t>Alerts team and others about changes in branch before merge</a:t>
             </a:r>
           </a:p>
           <a:p>
@@ -7665,7 +7777,15 @@
             <a:pPr lvl="1"/>
             <a:r>
               <a:rPr lang="en-US" dirty="0"/>
-              <a:t>Forking requires read access to the main (often referred to as “upstream”) repository</a:t>
+              <a:t>Forking requires read access to the </a:t>
+            </a:r>
+            <a:r>
+              <a:rPr lang="en-US" i="1" dirty="0"/>
+              <a:t>upstream</a:t>
+            </a:r>
+            <a:r>
+              <a:rPr lang="en-US" dirty="0"/>
+              <a:t> repository</a:t>
             </a:r>
           </a:p>
           <a:p>
@@ -7679,7 +7799,7 @@
             <a:pPr lvl="2"/>
             <a:r>
               <a:rPr lang="en-US" dirty="0"/>
-              <a:t>Other users can be granted write access to your fork</a:t>
+              <a:t>External collaborators can be granted write access to your fork</a:t>
             </a:r>
           </a:p>
           <a:p>
@@ -8339,7 +8459,7 @@
             </a:pPr>
             <a:r>
               <a:rPr lang="en-US" dirty="0"/>
-              <a:t>Main Ideas</a:t>
+              <a:t>Key Ideas</a:t>
             </a:r>
           </a:p>
           <a:p>
@@ -8526,13 +8646,13 @@
             </a:pPr>
             <a:r>
               <a:rPr lang="en-US" dirty="0"/>
-              <a:t>Main Ideas</a:t>
+              <a:t>Key Ideas</a:t>
             </a:r>
           </a:p>
           <a:p>
             <a:r>
               <a:rPr lang="en-US" sz="2000" dirty="0"/>
-              <a:t>Main branch is staging area</a:t>
+              <a:t>main branch is staging area</a:t>
             </a:r>
           </a:p>
           <a:p>
@@ -10535,7 +10655,7 @@
             </a:pPr>
             <a:r>
               <a:rPr lang="en-US" sz="2000" dirty="0"/>
-              <a:t>Master and supported branches work at all times</a:t>
+              <a:t>Main and supported branches work at all times</a:t>
             </a:r>
           </a:p>
           <a:p>
@@ -13006,14 +13126,22 @@
           <a:p>
             <a:r>
               <a:rPr lang="en-US" dirty="0"/>
-              <a:t>Historically git repository platforms used the term main as the default branch for the main branch. </a:t>
+              <a:t>Historically git used master as the </a:t>
+            </a:r>
+            <a:r>
+              <a:rPr lang="en-US" i="1" dirty="0"/>
+              <a:t>default</a:t>
+            </a:r>
+            <a:r>
+              <a:rPr lang="en-US" dirty="0"/>
+              <a:t> branch name for a new repository. </a:t>
             </a:r>
           </a:p>
           <a:p>
             <a:pPr lvl="1"/>
             <a:r>
               <a:rPr lang="en-US" dirty="0"/>
-              <a:t>The master-slave relationship in technology was used to refer to a system where one – the main - controls other copies, or processes.</a:t>
+              <a:t>master as a single, isolated term has a close affiliation with the problematic language of master/slave and so has recently undergone replacement.</a:t>
             </a:r>
           </a:p>
           <a:p>
@@ -13027,39 +13155,34 @@
             </a:r>
             <a:r>
               <a:rPr lang="en-US" dirty="0"/>
-              <a:t> and Gitlab have changed the default for the main branch to main</a:t>
+              <a:t> and Gitlab have changed their default branch name to main</a:t>
             </a:r>
           </a:p>
           <a:p>
             <a:pPr lvl="1"/>
             <a:r>
               <a:rPr lang="en-US" dirty="0"/>
-              <a:t>All new repositories will have this default</a:t>
+              <a:t>New repositories begin with this default.</a:t>
             </a:r>
           </a:p>
           <a:p>
             <a:pPr lvl="1"/>
             <a:r>
               <a:rPr lang="en-US" dirty="0"/>
-              <a:t>Many workflows had already set their default branch to other neutral names such as </a:t>
-            </a:r>
-            <a:r>
-              <a:rPr lang="en-US" dirty="0" err="1"/>
-              <a:t>devel</a:t>
-            </a:r>
-            <a:endParaRPr lang="en-US" dirty="0"/>
+              <a:t>Many existing projects renamed their default branch to something like main or develop</a:t>
+            </a:r>
           </a:p>
           <a:p>
             <a:pPr lvl="1"/>
             <a:r>
               <a:rPr lang="en-US" dirty="0"/>
-              <a:t>For some older projects the branch may still be the older default, but we anticipate they will adopt a more neutral practice</a:t>
-            </a:r>
-          </a:p>
-          <a:p>
-            <a:r>
-              <a:rPr lang="en-US" dirty="0"/>
-              <a:t>For this presentation we use main even for those that have not yet adopted</a:t>
+              <a:t>Older projects may still use master, but we anticipate they will change the naming over time.</a:t>
+            </a:r>
+          </a:p>
+          <a:p>
+            <a:r>
+              <a:rPr lang="en-US" dirty="0"/>
+              <a:t>For this presentation we use main as the default branch</a:t>
             </a:r>
           </a:p>
         </p:txBody>
@@ -13903,7 +14026,7 @@
             <a:pPr lvl="1"/>
             <a:r>
               <a:rPr lang="en-US" dirty="0"/>
-              <a:t>Enables outside contributors that have read access only</a:t>
+              <a:t>Enables contributions from external collaborators that have read access only</a:t>
             </a:r>
           </a:p>
           <a:p>
@@ -15419,9 +15542,12 @@
 </file>
 
 <file path=customXml/item1.xml><?xml version="1.0" encoding="utf-8"?>
-<p:properties xmlns:p="http://schemas.microsoft.com/office/2006/metadata/properties" xmlns:xsi="http://www.w3.org/2001/XMLSchema-instance" xmlns:pc="http://schemas.microsoft.com/office/infopath/2007/PartnerControls">
-  <documentManagement/>
-</p:properties>
+<?mso-contentType ?>
+<FormTemplates xmlns="http://schemas.microsoft.com/sharepoint/v3/contenttype/forms">
+  <Display>DocumentLibraryForm</Display>
+  <Edit>DocumentLibraryForm</Edit>
+  <New>DocumentLibraryForm</New>
+</FormTemplates>
 </file>
 
 <file path=customXml/item2.xml><?xml version="1.0" encoding="utf-8"?>
@@ -15474,25 +15600,15 @@
 </file>
 
 <file path=customXml/item3.xml><?xml version="1.0" encoding="utf-8"?>
-<?mso-contentType ?>
-<FormTemplates xmlns="http://schemas.microsoft.com/sharepoint/v3/contenttype/forms">
-  <Display>DocumentLibraryForm</Display>
-  <Edit>DocumentLibraryForm</Edit>
-  <New>DocumentLibraryForm</New>
-</FormTemplates>
+<p:properties xmlns:p="http://schemas.microsoft.com/office/2006/metadata/properties" xmlns:xsi="http://www.w3.org/2001/XMLSchema-instance" xmlns:pc="http://schemas.microsoft.com/office/infopath/2007/PartnerControls">
+  <documentManagement/>
+</p:properties>
 </file>
 
 <file path=customXml/itemProps1.xml><?xml version="1.0" encoding="utf-8"?>
-<ds:datastoreItem xmlns:ds="http://schemas.openxmlformats.org/officeDocument/2006/customXml" ds:itemID="{A50EC660-24D0-43A0-AE5E-E274115E726B}">
+<ds:datastoreItem xmlns:ds="http://schemas.openxmlformats.org/officeDocument/2006/customXml" ds:itemID="{19E20559-B232-4371-8690-E3D8007EDB82}">
   <ds:schemaRefs>
-    <ds:schemaRef ds:uri="http://purl.org/dc/elements/1.1/"/>
-    <ds:schemaRef ds:uri="http://schemas.microsoft.com/office/2006/metadata/properties"/>
-    <ds:schemaRef ds:uri="http://purl.org/dc/terms/"/>
-    <ds:schemaRef ds:uri="http://schemas.openxmlformats.org/package/2006/metadata/core-properties"/>
-    <ds:schemaRef ds:uri="http://schemas.microsoft.com/office/2006/documentManagement/types"/>
-    <ds:schemaRef ds:uri="http://www.w3.org/XML/1998/namespace"/>
-    <ds:schemaRef ds:uri="http://purl.org/dc/dcmitype/"/>
-    <ds:schemaRef ds:uri="http://schemas.microsoft.com/office/infopath/2007/PartnerControls"/>
+    <ds:schemaRef ds:uri="http://schemas.microsoft.com/sharepoint/v3/contenttype/forms"/>
   </ds:schemaRefs>
 </ds:datastoreItem>
 </file>
@@ -15513,9 +15629,16 @@
 </file>
 
 <file path=customXml/itemProps3.xml><?xml version="1.0" encoding="utf-8"?>
-<ds:datastoreItem xmlns:ds="http://schemas.openxmlformats.org/officeDocument/2006/customXml" ds:itemID="{19E20559-B232-4371-8690-E3D8007EDB82}">
+<ds:datastoreItem xmlns:ds="http://schemas.openxmlformats.org/officeDocument/2006/customXml" ds:itemID="{A50EC660-24D0-43A0-AE5E-E274115E726B}">
   <ds:schemaRefs>
-    <ds:schemaRef ds:uri="http://schemas.microsoft.com/sharepoint/v3/contenttype/forms"/>
+    <ds:schemaRef ds:uri="http://purl.org/dc/elements/1.1/"/>
+    <ds:schemaRef ds:uri="http://schemas.microsoft.com/office/2006/metadata/properties"/>
+    <ds:schemaRef ds:uri="http://purl.org/dc/terms/"/>
+    <ds:schemaRef ds:uri="http://schemas.openxmlformats.org/package/2006/metadata/core-properties"/>
+    <ds:schemaRef ds:uri="http://schemas.microsoft.com/office/2006/documentManagement/types"/>
+    <ds:schemaRef ds:uri="http://www.w3.org/XML/1998/namespace"/>
+    <ds:schemaRef ds:uri="http://purl.org/dc/dcmitype/"/>
+    <ds:schemaRef ds:uri="http://schemas.microsoft.com/office/infopath/2007/PartnerControls"/>
   </ds:schemaRefs>
 </ds:datastoreItem>
 </file>
</xml_diff>

<commit_message>
Add Code Review slides.
</commit_message>
<xml_diff>
--- a/git-workflows.pptx
+++ b/git-workflows.pptx
@@ -5,10 +5,10 @@
     <p:sldMasterId id="2147483935" r:id="rId4"/>
   </p:sldMasterIdLst>
   <p:notesMasterIdLst>
-    <p:notesMasterId r:id="rId29"/>
+    <p:notesMasterId r:id="rId31"/>
   </p:notesMasterIdLst>
   <p:handoutMasterIdLst>
-    <p:handoutMasterId r:id="rId30"/>
+    <p:handoutMasterId r:id="rId32"/>
   </p:handoutMasterIdLst>
   <p:sldIdLst>
     <p:sldId id="523" r:id="rId5"/>
@@ -26,15 +26,17 @@
     <p:sldId id="321" r:id="rId17"/>
     <p:sldId id="545" r:id="rId18"/>
     <p:sldId id="531" r:id="rId19"/>
-    <p:sldId id="548" r:id="rId20"/>
-    <p:sldId id="325" r:id="rId21"/>
-    <p:sldId id="326" r:id="rId22"/>
-    <p:sldId id="332" r:id="rId23"/>
-    <p:sldId id="550" r:id="rId24"/>
-    <p:sldId id="323" r:id="rId25"/>
-    <p:sldId id="551" r:id="rId26"/>
-    <p:sldId id="553" r:id="rId27"/>
-    <p:sldId id="333" r:id="rId28"/>
+    <p:sldId id="556" r:id="rId20"/>
+    <p:sldId id="557" r:id="rId21"/>
+    <p:sldId id="548" r:id="rId22"/>
+    <p:sldId id="325" r:id="rId23"/>
+    <p:sldId id="326" r:id="rId24"/>
+    <p:sldId id="332" r:id="rId25"/>
+    <p:sldId id="550" r:id="rId26"/>
+    <p:sldId id="323" r:id="rId27"/>
+    <p:sldId id="551" r:id="rId28"/>
+    <p:sldId id="553" r:id="rId29"/>
+    <p:sldId id="333" r:id="rId30"/>
   </p:sldIdLst>
   <p:sldSz cx="12188825" cy="6858000"/>
   <p:notesSz cx="7010400" cy="9296400"/>
@@ -278,7 +280,7 @@
           <a:p>
             <a:fld id="{0B842F42-2CE9-4E35-95C1-410DC08A50B1}" type="datetimeFigureOut">
               <a:rPr lang="en-US" smtClean="0"/>
-              <a:t>9/17/21</a:t>
+              <a:t>9/20/21</a:t>
             </a:fld>
             <a:endParaRPr lang="en-US"/>
           </a:p>
@@ -443,7 +445,7 @@
           <a:p>
             <a:fld id="{6F282904-F315-4730-8D91-37D99E141A6F}" type="datetimeFigureOut">
               <a:rPr lang="en-US" smtClean="0"/>
-              <a:t>9/17/21</a:t>
+              <a:t>9/20/21</a:t>
             </a:fld>
             <a:endParaRPr lang="en-US"/>
           </a:p>
@@ -1296,7 +1298,7 @@
           <a:p>
             <a:fld id="{54E672D7-8E2D-4611-973D-F4591A707C34}" type="slidenum">
               <a:rPr lang="en-US" smtClean="0"/>
-              <a:t>17</a:t>
+              <a:t>19</a:t>
             </a:fld>
             <a:endParaRPr lang="en-US"/>
           </a:p>
@@ -1380,7 +1382,7 @@
           <a:p>
             <a:fld id="{54E672D7-8E2D-4611-973D-F4591A707C34}" type="slidenum">
               <a:rPr lang="en-US" smtClean="0"/>
-              <a:t>18</a:t>
+              <a:t>20</a:t>
             </a:fld>
             <a:endParaRPr lang="en-US"/>
           </a:p>
@@ -1464,7 +1466,7 @@
           <a:p>
             <a:fld id="{54E672D7-8E2D-4611-973D-F4591A707C34}" type="slidenum">
               <a:rPr lang="en-US" smtClean="0"/>
-              <a:t>19</a:t>
+              <a:t>21</a:t>
             </a:fld>
             <a:endParaRPr lang="en-US"/>
           </a:p>
@@ -1791,7 +1793,7 @@
           <a:p>
             <a:fld id="{54E672D7-8E2D-4611-973D-F4591A707C34}" type="slidenum">
               <a:rPr lang="en-US" smtClean="0"/>
-              <a:t>21</a:t>
+              <a:t>23</a:t>
             </a:fld>
             <a:endParaRPr lang="en-US"/>
           </a:p>
@@ -1906,7 +1908,7 @@
           <a:p>
             <a:fld id="{54E672D7-8E2D-4611-973D-F4591A707C34}" type="slidenum">
               <a:rPr lang="en-US" smtClean="0"/>
-              <a:t>22</a:t>
+              <a:t>24</a:t>
             </a:fld>
             <a:endParaRPr lang="en-US"/>
           </a:p>
@@ -2112,7 +2114,7 @@
           <a:p>
             <a:fld id="{54E672D7-8E2D-4611-973D-F4591A707C34}" type="slidenum">
               <a:rPr lang="en-US" smtClean="0"/>
-              <a:t>23</a:t>
+              <a:t>25</a:t>
             </a:fld>
             <a:endParaRPr lang="en-US"/>
           </a:p>
@@ -2196,7 +2198,7 @@
           <a:p>
             <a:fld id="{54E672D7-8E2D-4611-973D-F4591A707C34}" type="slidenum">
               <a:rPr lang="en-US" smtClean="0"/>
-              <a:t>24</a:t>
+              <a:t>26</a:t>
             </a:fld>
             <a:endParaRPr lang="en-US"/>
           </a:p>
@@ -7874,7 +7876,7 @@
           <p:cNvPr id="2" name="Title 1">
             <a:extLst>
               <a:ext uri="{FF2B5EF4-FFF2-40B4-BE49-F238E27FC236}">
-                <a16:creationId xmlns:a16="http://schemas.microsoft.com/office/drawing/2014/main" id="{F07038E7-EEB4-9043-9EA1-7BA9EA5F3241}"/>
+                <a16:creationId xmlns:a16="http://schemas.microsoft.com/office/drawing/2014/main" id="{1D42A50A-4072-6A46-BFD0-09B711A73760}"/>
               </a:ext>
             </a:extLst>
           </p:cNvPr>
@@ -7887,8 +7889,8 @@
         </p:nvSpPr>
         <p:spPr>
           <a:xfrm>
-            <a:off x="365760" y="411480"/>
-            <a:ext cx="11372473" cy="679383"/>
+            <a:off x="406843" y="190500"/>
+            <a:ext cx="11372473" cy="914400"/>
           </a:xfrm>
         </p:spPr>
         <p:txBody>
@@ -7897,21 +7899,8 @@
           <a:p>
             <a:r>
               <a:rPr lang="en-US" dirty="0"/>
-              <a:t>Git Workflow Models of Different complexity</a:t>
-            </a:r>
-            <a:br>
-              <a:rPr lang="en-US" dirty="0"/>
-            </a:br>
-            <a:br>
-              <a:rPr lang="en-US" dirty="0"/>
-            </a:br>
-            <a:br>
-              <a:rPr lang="en-US" dirty="0"/>
-            </a:br>
-            <a:br>
-              <a:rPr lang="en-US" dirty="0"/>
-            </a:br>
-            <a:endParaRPr lang="en-US" dirty="0"/>
+              <a:t>Code Review – What peer code review can provide</a:t>
+            </a:r>
           </a:p>
         </p:txBody>
       </p:sp>
@@ -7920,7 +7909,7 @@
           <p:cNvPr id="3" name="Content Placeholder 2">
             <a:extLst>
               <a:ext uri="{FF2B5EF4-FFF2-40B4-BE49-F238E27FC236}">
-                <a16:creationId xmlns:a16="http://schemas.microsoft.com/office/drawing/2014/main" id="{BC4025A8-D322-7F4C-BD72-C65AC6A3E843}"/>
+                <a16:creationId xmlns:a16="http://schemas.microsoft.com/office/drawing/2014/main" id="{99FBF6DE-C30C-2C49-B5E7-CC621541936F}"/>
               </a:ext>
             </a:extLst>
           </p:cNvPr>
@@ -7933,56 +7922,194 @@
         </p:nvSpPr>
         <p:spPr>
           <a:xfrm>
-            <a:off x="363096" y="1203559"/>
-            <a:ext cx="11369809" cy="2517808"/>
+            <a:off x="409507" y="742950"/>
+            <a:ext cx="11369809" cy="4794250"/>
           </a:xfrm>
         </p:spPr>
         <p:txBody>
           <a:bodyPr/>
           <a:lstStyle/>
           <a:p>
+            <a:r>
+              <a:rPr lang="en-US" dirty="0"/>
+              <a:t>Allows discussion of proposed changes</a:t>
+            </a:r>
+          </a:p>
+          <a:p>
+            <a:pPr lvl="1"/>
+            <a:r>
+              <a:rPr lang="en-US" dirty="0"/>
+              <a:t>Iterations for better code</a:t>
+            </a:r>
+          </a:p>
+          <a:p>
+            <a:pPr lvl="1"/>
+            <a:r>
+              <a:rPr lang="en-US" dirty="0"/>
+              <a:t>Discussions and reviewing allow more understanding of the code </a:t>
+            </a:r>
+          </a:p>
+          <a:p>
+            <a:r>
+              <a:rPr lang="en-US" dirty="0"/>
+              <a:t>Ensures requested change/feature met</a:t>
+            </a:r>
+          </a:p>
+          <a:p>
+            <a:r>
+              <a:rPr lang="en-US" dirty="0"/>
+              <a:t>Evaluates impact of the change</a:t>
+            </a:r>
+          </a:p>
+          <a:p>
+            <a:pPr lvl="1"/>
+            <a:r>
+              <a:rPr lang="en-US" dirty="0"/>
+              <a:t>Breakages</a:t>
+            </a:r>
+          </a:p>
+          <a:p>
+            <a:pPr lvl="1"/>
+            <a:r>
+              <a:rPr lang="en-US" dirty="0"/>
+              <a:t>Interactions with other parts of code</a:t>
+            </a:r>
+          </a:p>
+          <a:p>
+            <a:r>
+              <a:rPr lang="en-US" dirty="0"/>
+              <a:t>Ensures coding guidelines are met</a:t>
+            </a:r>
+          </a:p>
+          <a:p>
+            <a:r>
+              <a:rPr lang="en-US" dirty="0"/>
+              <a:t>Improves practices by learning</a:t>
+            </a:r>
+          </a:p>
+          <a:p>
+            <a:pPr lvl="1"/>
+            <a:r>
+              <a:rPr lang="en-US" dirty="0"/>
+              <a:t>About other parts of the code</a:t>
+            </a:r>
+          </a:p>
+          <a:p>
+            <a:pPr lvl="1"/>
+            <a:r>
+              <a:rPr lang="en-US" dirty="0"/>
+              <a:t>Helpful coding techniques by other’s</a:t>
+            </a:r>
+          </a:p>
+          <a:p>
             <a:pPr marL="0" indent="0">
               <a:buNone/>
             </a:pPr>
-            <a:r>
-              <a:rPr lang="en-US" b="1" dirty="0"/>
-              <a:t>Commonly Known Workflows</a:t>
-            </a:r>
-          </a:p>
-          <a:p>
-            <a:r>
-              <a:rPr lang="en-US" dirty="0"/>
-              <a:t>Git Flow</a:t>
-            </a:r>
-          </a:p>
-          <a:p>
-            <a:r>
-              <a:rPr lang="en-US" dirty="0" err="1"/>
-              <a:t>Github</a:t>
-            </a:r>
-            <a:r>
-              <a:rPr lang="en-US" dirty="0"/>
-              <a:t> Flow</a:t>
-            </a:r>
-          </a:p>
-          <a:p>
-            <a:r>
-              <a:rPr lang="en-US" dirty="0"/>
-              <a:t>Gitlab Flow</a:t>
-            </a:r>
-          </a:p>
+            <a:endParaRPr lang="en-US" dirty="0"/>
+          </a:p>
+        </p:txBody>
+      </p:sp>
+      <p:sp>
+        <p:nvSpPr>
+          <p:cNvPr id="4" name="TextBox 3">
+            <a:extLst>
+              <a:ext uri="{FF2B5EF4-FFF2-40B4-BE49-F238E27FC236}">
+                <a16:creationId xmlns:a16="http://schemas.microsoft.com/office/drawing/2014/main" id="{3221CF11-B650-9D4F-B9A0-430ED74F62F2}"/>
+              </a:ext>
+            </a:extLst>
+          </p:cNvPr>
+          <p:cNvSpPr txBox="1"/>
+          <p:nvPr/>
+        </p:nvSpPr>
+        <p:spPr>
+          <a:xfrm>
+            <a:off x="5618979" y="4216400"/>
+            <a:ext cx="6468246" cy="1015663"/>
+          </a:xfrm>
+          <a:prstGeom prst="rect">
+            <a:avLst/>
+          </a:prstGeom>
+          <a:noFill/>
+        </p:spPr>
+        <p:txBody>
+          <a:bodyPr wrap="none" lIns="118872" tIns="91440" rIns="118872" bIns="91440" rtlCol="0" anchor="ctr" anchorCtr="0">
+            <a:spAutoFit/>
+          </a:bodyPr>
+          <a:lstStyle/>
           <a:p>
             <a:pPr marL="0" indent="0">
               <a:buNone/>
             </a:pPr>
+            <a:r>
+              <a:rPr lang="en-US" dirty="0"/>
+              <a:t>Blog: </a:t>
+            </a:r>
+            <a:r>
+              <a:rPr lang="en-US" dirty="0">
+                <a:hlinkClick r:id="rId2" tooltip="How to code review in a Pull Request"/>
+              </a:rPr>
+              <a:t>How to code review in a Pull Request</a:t>
+            </a:r>
             <a:endParaRPr lang="en-US" dirty="0"/>
+          </a:p>
+          <a:p>
+            <a:pPr marL="0" indent="0">
+              <a:buNone/>
+            </a:pPr>
+            <a:r>
+              <a:rPr lang="en-US" dirty="0"/>
+              <a:t>Author: </a:t>
+            </a:r>
+            <a:r>
+              <a:rPr lang="en-US" b="1" dirty="0">
+                <a:hlinkClick r:id="rId3"/>
+              </a:rPr>
+              <a:t>Hugo Sousa</a:t>
+            </a:r>
+            <a:r>
+              <a:rPr lang="en-US" b="1" dirty="0"/>
+              <a:t> </a:t>
+            </a:r>
+            <a:r>
+              <a:rPr lang="en-US" dirty="0"/>
+              <a:t>- March 17, 2021</a:t>
+            </a:r>
+          </a:p>
+          <a:p>
+            <a:pPr marL="0" indent="0">
+              <a:buNone/>
+            </a:pPr>
+            <a:r>
+              <a:rPr lang="en-US" dirty="0">
+                <a:solidFill>
+                  <a:srgbClr val="AA2F36"/>
+                </a:solidFill>
+              </a:rPr>
+              <a:t>https://</a:t>
+            </a:r>
+            <a:r>
+              <a:rPr lang="en-US" dirty="0" err="1">
+                <a:solidFill>
+                  <a:srgbClr val="AA2F36"/>
+                </a:solidFill>
+              </a:rPr>
+              <a:t>blog.codacy.com</a:t>
+            </a:r>
+            <a:r>
+              <a:rPr lang="en-US" dirty="0">
+                <a:solidFill>
+                  <a:srgbClr val="AA2F36"/>
+                </a:solidFill>
+              </a:rPr>
+              <a:t>/how-to-code-review-in-a-pull-request</a:t>
+            </a:r>
           </a:p>
         </p:txBody>
       </p:sp>
     </p:spTree>
     <p:extLst>
       <p:ext uri="{BB962C8B-B14F-4D97-AF65-F5344CB8AC3E}">
-        <p14:creationId xmlns:p14="http://schemas.microsoft.com/office/powerpoint/2010/main" val="4060798534"/>
+        <p14:creationId xmlns:p14="http://schemas.microsoft.com/office/powerpoint/2010/main" val="3267493295"/>
       </p:ext>
     </p:extLst>
   </p:cSld>
@@ -8014,7 +8141,7 @@
           <p:cNvPr id="2" name="Title 1">
             <a:extLst>
               <a:ext uri="{FF2B5EF4-FFF2-40B4-BE49-F238E27FC236}">
-                <a16:creationId xmlns:a16="http://schemas.microsoft.com/office/drawing/2014/main" id="{5780C519-1EB3-8846-B9E7-B3E551D14DB0}"/>
+                <a16:creationId xmlns:a16="http://schemas.microsoft.com/office/drawing/2014/main" id="{1D42A50A-4072-6A46-BFD0-09B711A73760}"/>
               </a:ext>
             </a:extLst>
           </p:cNvPr>
@@ -8025,29 +8152,24 @@
             <p:ph type="title"/>
           </p:nvPr>
         </p:nvSpPr>
-        <p:spPr>
-          <a:xfrm>
-            <a:off x="408175" y="174034"/>
-            <a:ext cx="11372473" cy="914400"/>
-          </a:xfrm>
-        </p:spPr>
+        <p:spPr/>
         <p:txBody>
           <a:bodyPr/>
           <a:lstStyle/>
           <a:p>
             <a:r>
               <a:rPr lang="en-US" dirty="0"/>
-              <a:t>Git Flow</a:t>
-            </a:r>
-          </a:p>
-        </p:txBody>
-      </p:sp>
-      <p:sp>
-        <p:nvSpPr>
-          <p:cNvPr id="12" name="Content Placeholder 2">
+              <a:t>Code Review  - Improvement and Practices</a:t>
+            </a:r>
+          </a:p>
+        </p:txBody>
+      </p:sp>
+      <p:sp>
+        <p:nvSpPr>
+          <p:cNvPr id="3" name="Content Placeholder 2">
             <a:extLst>
               <a:ext uri="{FF2B5EF4-FFF2-40B4-BE49-F238E27FC236}">
-                <a16:creationId xmlns:a16="http://schemas.microsoft.com/office/drawing/2014/main" id="{F7E13A38-2353-E14A-841B-4D9CC88C8EA3}"/>
+                <a16:creationId xmlns:a16="http://schemas.microsoft.com/office/drawing/2014/main" id="{99FBF6DE-C30C-2C49-B5E7-CC621541936F}"/>
               </a:ext>
             </a:extLst>
           </p:cNvPr>
@@ -8060,281 +8182,153 @@
         </p:nvSpPr>
         <p:spPr>
           <a:xfrm>
-            <a:off x="5411977" y="516171"/>
-            <a:ext cx="6500623" cy="4047778"/>
+            <a:off x="365760" y="1325880"/>
+            <a:ext cx="11369809" cy="4935220"/>
           </a:xfrm>
         </p:spPr>
         <p:txBody>
           <a:bodyPr/>
           <a:lstStyle/>
           <a:p>
-            <a:pPr marL="285750" indent="-285750">
-              <a:buFont typeface="Arial" panose="020B0604020202020204" pitchFamily="34" charset="0"/>
-              <a:buChar char="•"/>
-            </a:pPr>
-            <a:r>
-              <a:rPr lang="en-US" dirty="0"/>
-              <a:t>Full-featured workflow</a:t>
-            </a:r>
-          </a:p>
-          <a:p>
-            <a:pPr marL="285750" indent="-285750">
-              <a:buFont typeface="Arial" panose="020B0604020202020204" pitchFamily="34" charset="0"/>
-              <a:buChar char="•"/>
-            </a:pPr>
-            <a:r>
-              <a:rPr lang="en-US" dirty="0"/>
-              <a:t>Increased complexity</a:t>
-            </a:r>
-          </a:p>
-          <a:p>
-            <a:pPr marL="285750" indent="-285750">
-              <a:buFont typeface="Arial" panose="020B0604020202020204" pitchFamily="34" charset="0"/>
-              <a:buChar char="•"/>
-            </a:pPr>
-            <a:r>
-              <a:rPr lang="en-US" dirty="0"/>
-              <a:t>Designed for SW with official releases</a:t>
-            </a:r>
-          </a:p>
-          <a:p>
-            <a:pPr marL="285750" indent="-285750">
-              <a:buFont typeface="Arial" panose="020B0604020202020204" pitchFamily="34" charset="0"/>
-              <a:buChar char="•"/>
-            </a:pPr>
-            <a:r>
-              <a:rPr lang="en-US" dirty="0"/>
-              <a:t>Feature branches based off of develop</a:t>
-            </a:r>
-          </a:p>
-          <a:p>
-            <a:pPr marL="285750" indent="-285750">
-              <a:buFont typeface="Arial" panose="020B0604020202020204" pitchFamily="34" charset="0"/>
-              <a:buChar char="•"/>
-            </a:pPr>
-            <a:r>
-              <a:rPr lang="en-US" dirty="0">
-                <a:hlinkClick r:id="rId3"/>
+            <a:r>
+              <a:rPr lang="en-US" dirty="0"/>
+              <a:t>Helpful Practices for Scientific Research Software</a:t>
+            </a:r>
+          </a:p>
+          <a:p>
+            <a:pPr lvl="1"/>
+            <a:r>
+              <a:rPr lang="en-US" dirty="0"/>
+              <a:t>Make code review process formal with structured guideline</a:t>
+            </a:r>
+          </a:p>
+          <a:p>
+            <a:pPr lvl="1"/>
+            <a:r>
+              <a:rPr lang="en-US" dirty="0"/>
+              <a:t>Allocate sufficient time in the development process to perform code review</a:t>
+            </a:r>
+          </a:p>
+          <a:p>
+            <a:pPr lvl="1"/>
+            <a:r>
+              <a:rPr lang="en-US" dirty="0"/>
+              <a:t>Try to ensure at least one science review and one technical review</a:t>
+            </a:r>
+          </a:p>
+          <a:p>
+            <a:pPr lvl="1"/>
+            <a:r>
+              <a:rPr lang="en-US" dirty="0"/>
+              <a:t>Timely reviews - provide quick feedback to incoming review requests</a:t>
+            </a:r>
+          </a:p>
+          <a:p>
+            <a:pPr lvl="1"/>
+            <a:r>
+              <a:rPr lang="en-US" dirty="0"/>
+              <a:t>Train reviewers on how to phrase good feedback</a:t>
+            </a:r>
+          </a:p>
+          <a:p>
+            <a:pPr lvl="1"/>
+            <a:r>
+              <a:rPr lang="en-US" dirty="0"/>
+              <a:t>Train developers to accept comments to improve their code</a:t>
+            </a:r>
+          </a:p>
+          <a:p>
+            <a:pPr lvl="1"/>
+            <a:r>
+              <a:rPr lang="en-US" dirty="0"/>
+              <a:t>Include automatic code review tool and train reviewers in best use practice of the tool</a:t>
+            </a:r>
+          </a:p>
+          <a:p>
+            <a:pPr lvl="1"/>
+            <a:endParaRPr lang="en-US" dirty="0"/>
+          </a:p>
+          <a:p>
+            <a:pPr marL="0" indent="0">
+              <a:buNone/>
+            </a:pPr>
+            <a:r>
+              <a:rPr lang="en-US" sz="2000" b="1" dirty="0"/>
+              <a:t>Testing and Code Review Practices in Research Software Development </a:t>
+            </a:r>
+            <a:r>
+              <a:rPr lang="en-US" sz="2000" dirty="0"/>
+              <a:t>(2020-09-09)</a:t>
+            </a:r>
+          </a:p>
+          <a:p>
+            <a:pPr marL="0" indent="0">
+              <a:buNone/>
+            </a:pPr>
+            <a:r>
+              <a:rPr lang="en-US" sz="2000" b="1" dirty="0"/>
+              <a:t>Presenter:</a:t>
+            </a:r>
+            <a:r>
+              <a:rPr lang="en-US" sz="2000" dirty="0"/>
+              <a:t> Nasir </a:t>
+            </a:r>
+            <a:r>
+              <a:rPr lang="en-US" sz="2000" dirty="0" err="1"/>
+              <a:t>Eisty</a:t>
+            </a:r>
+            <a:endParaRPr lang="en-US" sz="2000" dirty="0"/>
+          </a:p>
+          <a:p>
+            <a:pPr marL="346075" lvl="1" indent="0">
+              <a:buNone/>
+            </a:pPr>
+            <a:r>
+              <a:rPr lang="en-US" u="sng" dirty="0">
+                <a:solidFill>
+                  <a:srgbClr val="D13940"/>
+                </a:solidFill>
+                <a:uFill>
+                  <a:solidFill>
+                    <a:srgbClr val="D13940"/>
+                  </a:solidFill>
+                </a:uFill>
+                <a:hlinkClick r:id="rId2"/>
               </a:rPr>
-              <a:t>Git extensions</a:t>
-            </a:r>
-            <a:r>
-              <a:rPr lang="en-US" dirty="0"/>
-              <a:t> to enforce policy</a:t>
-            </a:r>
-          </a:p>
-          <a:p>
-            <a:pPr marL="285750" indent="-285750">
-              <a:buFont typeface="Arial" panose="020B0604020202020204" pitchFamily="34" charset="0"/>
-              <a:buChar char="•"/>
-            </a:pPr>
-            <a:r>
-              <a:rPr lang="en-US" dirty="0"/>
-              <a:t>How are develop and main synchronized?</a:t>
-            </a:r>
-          </a:p>
-          <a:p>
-            <a:pPr marL="285750" indent="-285750">
-              <a:buFont typeface="Arial" panose="020B0604020202020204" pitchFamily="34" charset="0"/>
-              <a:buChar char="•"/>
-            </a:pPr>
-            <a:r>
-              <a:rPr lang="en-US" dirty="0"/>
-              <a:t>Where do merge conflicts occur and how are they resolved?</a:t>
-            </a:r>
-          </a:p>
-        </p:txBody>
-      </p:sp>
-      <p:sp>
-        <p:nvSpPr>
-          <p:cNvPr id="7" name="TextBox 6">
-            <a:extLst>
-              <a:ext uri="{FF2B5EF4-FFF2-40B4-BE49-F238E27FC236}">
-                <a16:creationId xmlns:a16="http://schemas.microsoft.com/office/drawing/2014/main" id="{9EA3B929-9425-9A46-9997-AAEB3D2077BD}"/>
-              </a:ext>
-            </a:extLst>
-          </p:cNvPr>
-          <p:cNvSpPr txBox="1"/>
-          <p:nvPr/>
-        </p:nvSpPr>
-        <p:spPr>
-          <a:xfrm>
-            <a:off x="4891407" y="4758347"/>
-            <a:ext cx="7297418" cy="849463"/>
-          </a:xfrm>
-          <a:prstGeom prst="rect">
-            <a:avLst/>
-          </a:prstGeom>
-          <a:noFill/>
-        </p:spPr>
-        <p:txBody>
-          <a:bodyPr wrap="square" lIns="118872" tIns="91440" rIns="118872" bIns="91440" rtlCol="0" anchor="ctr" anchorCtr="0">
-            <a:spAutoFit/>
-          </a:bodyPr>
-          <a:lstStyle/>
-          <a:p>
-            <a:pPr algn="l">
-              <a:lnSpc>
-                <a:spcPct val="90000"/>
-              </a:lnSpc>
-            </a:pPr>
-            <a:r>
-              <a:rPr lang="en-US" sz="1600" b="1" dirty="0"/>
-              <a:t>Author: </a:t>
-            </a:r>
-            <a:r>
-              <a:rPr lang="en-US" sz="1600" dirty="0"/>
-              <a:t>Vincent Driessen</a:t>
-            </a:r>
-          </a:p>
-          <a:p>
-            <a:pPr>
-              <a:lnSpc>
-                <a:spcPct val="90000"/>
-              </a:lnSpc>
-            </a:pPr>
-            <a:r>
-              <a:rPr lang="en-US" sz="1600" b="1" dirty="0"/>
-              <a:t>Original Blog: </a:t>
-            </a:r>
-            <a:r>
-              <a:rPr lang="en-US" sz="1600" b="1" dirty="0">
-                <a:hlinkClick r:id="rId4"/>
-              </a:rPr>
-              <a:t>https://nvie.com/posts/a-successful-git-branching-model/</a:t>
-            </a:r>
-            <a:endParaRPr lang="en-US" sz="1600" b="1" dirty="0"/>
-          </a:p>
-          <a:p>
-            <a:pPr>
-              <a:lnSpc>
-                <a:spcPct val="90000"/>
-              </a:lnSpc>
-            </a:pPr>
-            <a:r>
-              <a:rPr lang="en-US" sz="1600" b="1" dirty="0"/>
-              <a:t>License: </a:t>
-            </a:r>
-            <a:r>
-              <a:rPr lang="en-US" sz="1600" dirty="0"/>
-              <a:t>Creative Commons </a:t>
-            </a:r>
-            <a:endParaRPr lang="en-US" sz="1600" b="1" dirty="0"/>
-          </a:p>
-        </p:txBody>
-      </p:sp>
-      <p:pic>
-        <p:nvPicPr>
-          <p:cNvPr id="8" name="Picture 7">
-            <a:extLst>
-              <a:ext uri="{FF2B5EF4-FFF2-40B4-BE49-F238E27FC236}">
-                <a16:creationId xmlns:a16="http://schemas.microsoft.com/office/drawing/2014/main" id="{AE3E601E-116A-0D4A-B3F6-EB5C127C6164}"/>
-              </a:ext>
-            </a:extLst>
-          </p:cNvPr>
-          <p:cNvPicPr>
-            <a:picLocks noChangeAspect="1"/>
-          </p:cNvPicPr>
-          <p:nvPr/>
-        </p:nvPicPr>
-        <p:blipFill>
-          <a:blip r:embed="rId5"/>
-          <a:stretch>
-            <a:fillRect/>
-          </a:stretch>
-        </p:blipFill>
-        <p:spPr>
-          <a:xfrm>
-            <a:off x="7705346" y="5408603"/>
-            <a:ext cx="1356767" cy="323577"/>
-          </a:xfrm>
-          <a:prstGeom prst="rect">
-            <a:avLst/>
-          </a:prstGeom>
-        </p:spPr>
-      </p:pic>
-      <p:pic>
-        <p:nvPicPr>
-          <p:cNvPr id="4" name="Picture 3">
-            <a:extLst>
-              <a:ext uri="{FF2B5EF4-FFF2-40B4-BE49-F238E27FC236}">
-                <a16:creationId xmlns:a16="http://schemas.microsoft.com/office/drawing/2014/main" id="{33B98FB3-53C2-B047-8060-0D102CF59E21}"/>
-              </a:ext>
-            </a:extLst>
-          </p:cNvPr>
-          <p:cNvPicPr>
-            <a:picLocks noChangeAspect="1"/>
-          </p:cNvPicPr>
-          <p:nvPr/>
-        </p:nvPicPr>
-        <p:blipFill>
-          <a:blip r:embed="rId6" cstate="print">
-            <a:extLst>
-              <a:ext uri="{28A0092B-C50C-407E-A947-70E740481C1C}">
-                <a14:useLocalDpi xmlns:a14="http://schemas.microsoft.com/office/drawing/2010/main" val="0"/>
-              </a:ext>
-            </a:extLst>
-          </a:blip>
-          <a:stretch>
-            <a:fillRect/>
-          </a:stretch>
-        </p:blipFill>
-        <p:spPr>
-          <a:xfrm>
-            <a:off x="408175" y="665457"/>
-            <a:ext cx="4506732" cy="6008976"/>
-          </a:xfrm>
-          <a:prstGeom prst="rect">
-            <a:avLst/>
-          </a:prstGeom>
-        </p:spPr>
-      </p:pic>
-      <p:sp>
-        <p:nvSpPr>
-          <p:cNvPr id="9" name="TextBox 8">
-            <a:extLst>
-              <a:ext uri="{FF2B5EF4-FFF2-40B4-BE49-F238E27FC236}">
-                <a16:creationId xmlns:a16="http://schemas.microsoft.com/office/drawing/2014/main" id="{2802D390-BEBC-A647-AFDC-5E606EA03997}"/>
-              </a:ext>
-            </a:extLst>
-          </p:cNvPr>
-          <p:cNvSpPr txBox="1"/>
-          <p:nvPr/>
-        </p:nvSpPr>
-        <p:spPr>
-          <a:xfrm>
-            <a:off x="3828641" y="730444"/>
-            <a:ext cx="822960" cy="295466"/>
-          </a:xfrm>
-          <a:prstGeom prst="rect">
-            <a:avLst/>
-          </a:prstGeom>
-          <a:solidFill>
-            <a:schemeClr val="bg1"/>
-          </a:solidFill>
-        </p:spPr>
-        <p:txBody>
-          <a:bodyPr wrap="square" lIns="118872" tIns="91440" rIns="118872" bIns="91440" rtlCol="0" anchor="ctr" anchorCtr="0">
-            <a:spAutoFit/>
-          </a:bodyPr>
-          <a:lstStyle/>
-          <a:p>
-            <a:pPr algn="l">
-              <a:lnSpc>
-                <a:spcPct val="90000"/>
-              </a:lnSpc>
-            </a:pPr>
-            <a:r>
-              <a:rPr lang="en-US" sz="800" b="1" dirty="0"/>
-              <a:t>  main  </a:t>
-            </a:r>
+              <a:t>https://ideas-productivity.org/events/hpc-best-practices-webinars/#webinar044</a:t>
+            </a:r>
+            <a:endParaRPr lang="en-US" u="sng" dirty="0">
+              <a:solidFill>
+                <a:srgbClr val="D13940"/>
+              </a:solidFill>
+              <a:uFill>
+                <a:solidFill>
+                  <a:srgbClr val="D13940"/>
+                </a:solidFill>
+              </a:uFill>
+            </a:endParaRPr>
+          </a:p>
+          <a:p>
+            <a:pPr marL="346075" lvl="1" indent="0">
+              <a:buNone/>
+            </a:pPr>
+            <a:endParaRPr lang="en-US" sz="1800" u="sng" dirty="0">
+              <a:solidFill>
+                <a:srgbClr val="D13940"/>
+              </a:solidFill>
+              <a:uFill>
+                <a:solidFill>
+                  <a:srgbClr val="D13940"/>
+                </a:solidFill>
+              </a:uFill>
+            </a:endParaRPr>
           </a:p>
         </p:txBody>
       </p:sp>
     </p:spTree>
     <p:extLst>
       <p:ext uri="{BB962C8B-B14F-4D97-AF65-F5344CB8AC3E}">
-        <p14:creationId xmlns:p14="http://schemas.microsoft.com/office/powerpoint/2010/main" val="1539049706"/>
+        <p14:creationId xmlns:p14="http://schemas.microsoft.com/office/powerpoint/2010/main" val="3057547454"/>
       </p:ext>
     </p:extLst>
   </p:cSld>
@@ -8366,7 +8360,7 @@
           <p:cNvPr id="2" name="Title 1">
             <a:extLst>
               <a:ext uri="{FF2B5EF4-FFF2-40B4-BE49-F238E27FC236}">
-                <a16:creationId xmlns:a16="http://schemas.microsoft.com/office/drawing/2014/main" id="{BD4BD5A9-082D-C54B-8AB5-B9AB79871188}"/>
+                <a16:creationId xmlns:a16="http://schemas.microsoft.com/office/drawing/2014/main" id="{F07038E7-EEB4-9043-9EA1-7BA9EA5F3241}"/>
               </a:ext>
             </a:extLst>
           </p:cNvPr>
@@ -8377,15 +8371,33 @@
             <p:ph type="title"/>
           </p:nvPr>
         </p:nvSpPr>
-        <p:spPr/>
+        <p:spPr>
+          <a:xfrm>
+            <a:off x="365760" y="411480"/>
+            <a:ext cx="11372473" cy="679383"/>
+          </a:xfrm>
+        </p:spPr>
         <p:txBody>
           <a:bodyPr/>
           <a:lstStyle/>
           <a:p>
             <a:r>
               <a:rPr lang="en-US" dirty="0"/>
-              <a:t>GitHub Flow</a:t>
-            </a:r>
+              <a:t>Git Workflow Models of Different complexity</a:t>
+            </a:r>
+            <a:br>
+              <a:rPr lang="en-US" dirty="0"/>
+            </a:br>
+            <a:br>
+              <a:rPr lang="en-US" dirty="0"/>
+            </a:br>
+            <a:br>
+              <a:rPr lang="en-US" dirty="0"/>
+            </a:br>
+            <a:br>
+              <a:rPr lang="en-US" dirty="0"/>
+            </a:br>
+            <a:endParaRPr lang="en-US" dirty="0"/>
           </a:p>
         </p:txBody>
       </p:sp>
@@ -8394,7 +8406,7 @@
           <p:cNvPr id="3" name="Content Placeholder 2">
             <a:extLst>
               <a:ext uri="{FF2B5EF4-FFF2-40B4-BE49-F238E27FC236}">
-                <a16:creationId xmlns:a16="http://schemas.microsoft.com/office/drawing/2014/main" id="{8B010D1E-98D6-8143-8514-9CB3935A6D58}"/>
+                <a16:creationId xmlns:a16="http://schemas.microsoft.com/office/drawing/2014/main" id="{BC4025A8-D322-7F4C-BD72-C65AC6A3E843}"/>
               </a:ext>
             </a:extLst>
           </p:cNvPr>
@@ -8407,8 +8419,8 @@
         </p:nvSpPr>
         <p:spPr>
           <a:xfrm>
-            <a:off x="368424" y="1197717"/>
-            <a:ext cx="11369809" cy="4047778"/>
+            <a:off x="363096" y="1203559"/>
+            <a:ext cx="11369809" cy="2517808"/>
           </a:xfrm>
         </p:spPr>
         <p:txBody>
@@ -8419,109 +8431,44 @@
               <a:buNone/>
             </a:pPr>
             <a:r>
-              <a:rPr lang="en-US" dirty="0">
-                <a:hlinkClick r:id="rId3"/>
-              </a:rPr>
-              <a:t>http://scottchacon.com/2011/08/31/github-flow.html</a:t>
-            </a:r>
+              <a:rPr lang="en-US" b="1" dirty="0"/>
+              <a:t>Commonly Known Workflows</a:t>
+            </a:r>
+          </a:p>
+          <a:p>
+            <a:r>
+              <a:rPr lang="en-US" dirty="0"/>
+              <a:t>Git Flow</a:t>
+            </a:r>
+          </a:p>
+          <a:p>
+            <a:r>
+              <a:rPr lang="en-US" dirty="0" err="1"/>
+              <a:t>Github</a:t>
+            </a:r>
+            <a:r>
+              <a:rPr lang="en-US" dirty="0"/>
+              <a:t> Flow</a:t>
+            </a:r>
+          </a:p>
+          <a:p>
+            <a:r>
+              <a:rPr lang="en-US" dirty="0"/>
+              <a:t>Gitlab Flow</a:t>
+            </a:r>
+          </a:p>
+          <a:p>
+            <a:pPr marL="0" indent="0">
+              <a:buNone/>
+            </a:pPr>
             <a:endParaRPr lang="en-US" dirty="0"/>
-          </a:p>
-          <a:p>
-            <a:pPr lvl="1"/>
-            <a:r>
-              <a:rPr lang="en-US" dirty="0"/>
-              <a:t>Published as viable alternative to Git Flow</a:t>
-            </a:r>
-          </a:p>
-          <a:p>
-            <a:pPr lvl="1"/>
-            <a:r>
-              <a:rPr lang="en-US" dirty="0"/>
-              <a:t>No structured release schedule</a:t>
-            </a:r>
-          </a:p>
-          <a:p>
-            <a:pPr lvl="1"/>
-            <a:r>
-              <a:rPr lang="en-US" dirty="0"/>
-              <a:t>Continuous deployment &amp; continuous integration allows for simpler workflow</a:t>
-            </a:r>
-          </a:p>
-          <a:p>
-            <a:pPr marL="346075" lvl="1" indent="0">
-              <a:buNone/>
-            </a:pPr>
-            <a:endParaRPr lang="en-US" dirty="0"/>
-          </a:p>
-          <a:p>
-            <a:pPr marL="0" indent="-49212">
-              <a:buNone/>
-            </a:pPr>
-            <a:r>
-              <a:rPr lang="en-US" dirty="0"/>
-              <a:t>Key Ideas</a:t>
-            </a:r>
-          </a:p>
-          <a:p>
-            <a:pPr marL="457200" indent="-457200">
-              <a:buFont typeface="+mj-lt"/>
-              <a:buAutoNum type="arabicPeriod"/>
-            </a:pPr>
-            <a:r>
-              <a:rPr lang="en-US" sz="2000" dirty="0"/>
-              <a:t>All commits in the main branch are </a:t>
-            </a:r>
-            <a:r>
-              <a:rPr lang="en-US" sz="2000" b="1" dirty="0"/>
-              <a:t>deployable</a:t>
-            </a:r>
-          </a:p>
-          <a:p>
-            <a:pPr marL="457200" indent="-457200">
-              <a:buFont typeface="+mj-lt"/>
-              <a:buAutoNum type="arabicPeriod"/>
-            </a:pPr>
-            <a:r>
-              <a:rPr lang="en-US" sz="2000" dirty="0"/>
-              <a:t>Base feature branches off of main</a:t>
-            </a:r>
-          </a:p>
-          <a:p>
-            <a:pPr marL="457200" indent="-457200">
-              <a:buFont typeface="+mj-lt"/>
-              <a:buAutoNum type="arabicPeriod"/>
-            </a:pPr>
-            <a:r>
-              <a:rPr lang="en-US" sz="2000" dirty="0"/>
-              <a:t>Push local repository to remote constantly</a:t>
-            </a:r>
-          </a:p>
-          <a:p>
-            <a:pPr marL="457200" indent="-457200">
-              <a:buFont typeface="+mj-lt"/>
-              <a:buAutoNum type="arabicPeriod"/>
-            </a:pPr>
-            <a:r>
-              <a:rPr lang="en-US" sz="2000" dirty="0"/>
-              <a:t>Open Pull Requests early to start dialogue</a:t>
-            </a:r>
-          </a:p>
-          <a:p>
-            <a:pPr marL="457200" indent="-457200">
-              <a:buFont typeface="+mj-lt"/>
-              <a:buAutoNum type="arabicPeriod"/>
-            </a:pPr>
-            <a:r>
-              <a:rPr lang="en-US" sz="2000" dirty="0"/>
-              <a:t>Merge into main after Pull Request review </a:t>
-            </a:r>
           </a:p>
         </p:txBody>
       </p:sp>
     </p:spTree>
     <p:extLst>
       <p:ext uri="{BB962C8B-B14F-4D97-AF65-F5344CB8AC3E}">
-        <p14:creationId xmlns:p14="http://schemas.microsoft.com/office/powerpoint/2010/main" val="3917958728"/>
+        <p14:creationId xmlns:p14="http://schemas.microsoft.com/office/powerpoint/2010/main" val="4060798534"/>
       </p:ext>
     </p:extLst>
   </p:cSld>
@@ -8553,7 +8500,7 @@
           <p:cNvPr id="2" name="Title 1">
             <a:extLst>
               <a:ext uri="{FF2B5EF4-FFF2-40B4-BE49-F238E27FC236}">
-                <a16:creationId xmlns:a16="http://schemas.microsoft.com/office/drawing/2014/main" id="{BD4BD5A9-082D-C54B-8AB5-B9AB79871188}"/>
+                <a16:creationId xmlns:a16="http://schemas.microsoft.com/office/drawing/2014/main" id="{5780C519-1EB3-8846-B9E7-B3E551D14DB0}"/>
               </a:ext>
             </a:extLst>
           </p:cNvPr>
@@ -8564,24 +8511,29 @@
             <p:ph type="title"/>
           </p:nvPr>
         </p:nvSpPr>
-        <p:spPr/>
+        <p:spPr>
+          <a:xfrm>
+            <a:off x="408175" y="174034"/>
+            <a:ext cx="11372473" cy="914400"/>
+          </a:xfrm>
+        </p:spPr>
         <p:txBody>
           <a:bodyPr/>
           <a:lstStyle/>
           <a:p>
             <a:r>
               <a:rPr lang="en-US" dirty="0"/>
-              <a:t>GitLab Flow</a:t>
-            </a:r>
-          </a:p>
-        </p:txBody>
-      </p:sp>
-      <p:sp>
-        <p:nvSpPr>
-          <p:cNvPr id="3" name="Content Placeholder 2">
+              <a:t>Git Flow</a:t>
+            </a:r>
+          </a:p>
+        </p:txBody>
+      </p:sp>
+      <p:sp>
+        <p:nvSpPr>
+          <p:cNvPr id="12" name="Content Placeholder 2">
             <a:extLst>
               <a:ext uri="{FF2B5EF4-FFF2-40B4-BE49-F238E27FC236}">
-                <a16:creationId xmlns:a16="http://schemas.microsoft.com/office/drawing/2014/main" id="{8B010D1E-98D6-8143-8514-9CB3935A6D58}"/>
+                <a16:creationId xmlns:a16="http://schemas.microsoft.com/office/drawing/2014/main" id="{F7E13A38-2353-E14A-841B-4D9CC88C8EA3}"/>
               </a:ext>
             </a:extLst>
           </p:cNvPr>
@@ -8594,108 +8546,281 @@
         </p:nvSpPr>
         <p:spPr>
           <a:xfrm>
-            <a:off x="365761" y="1212707"/>
-            <a:ext cx="10067394" cy="4047778"/>
+            <a:off x="5411977" y="516171"/>
+            <a:ext cx="6500623" cy="4047778"/>
           </a:xfrm>
         </p:spPr>
         <p:txBody>
           <a:bodyPr/>
           <a:lstStyle/>
           <a:p>
-            <a:pPr marL="0" indent="0">
-              <a:buNone/>
+            <a:pPr marL="285750" indent="-285750">
+              <a:buFont typeface="Arial" panose="020B0604020202020204" pitchFamily="34" charset="0"/>
+              <a:buChar char="•"/>
+            </a:pPr>
+            <a:r>
+              <a:rPr lang="en-US" dirty="0"/>
+              <a:t>Full-featured workflow</a:t>
+            </a:r>
+          </a:p>
+          <a:p>
+            <a:pPr marL="285750" indent="-285750">
+              <a:buFont typeface="Arial" panose="020B0604020202020204" pitchFamily="34" charset="0"/>
+              <a:buChar char="•"/>
+            </a:pPr>
+            <a:r>
+              <a:rPr lang="en-US" dirty="0"/>
+              <a:t>Increased complexity</a:t>
+            </a:r>
+          </a:p>
+          <a:p>
+            <a:pPr marL="285750" indent="-285750">
+              <a:buFont typeface="Arial" panose="020B0604020202020204" pitchFamily="34" charset="0"/>
+              <a:buChar char="•"/>
+            </a:pPr>
+            <a:r>
+              <a:rPr lang="en-US" dirty="0"/>
+              <a:t>Designed for SW with official releases</a:t>
+            </a:r>
+          </a:p>
+          <a:p>
+            <a:pPr marL="285750" indent="-285750">
+              <a:buFont typeface="Arial" panose="020B0604020202020204" pitchFamily="34" charset="0"/>
+              <a:buChar char="•"/>
+            </a:pPr>
+            <a:r>
+              <a:rPr lang="en-US" dirty="0"/>
+              <a:t>Feature branches based off of develop</a:t>
+            </a:r>
+          </a:p>
+          <a:p>
+            <a:pPr marL="285750" indent="-285750">
+              <a:buFont typeface="Arial" panose="020B0604020202020204" pitchFamily="34" charset="0"/>
+              <a:buChar char="•"/>
             </a:pPr>
             <a:r>
               <a:rPr lang="en-US" dirty="0">
                 <a:hlinkClick r:id="rId3"/>
               </a:rPr>
-              <a:t>https://docs.gitlab.com/ee/workflow/gitlab_flow.html</a:t>
-            </a:r>
-            <a:endParaRPr lang="en-US" dirty="0"/>
-          </a:p>
-          <a:p>
-            <a:pPr lvl="1"/>
-            <a:r>
-              <a:rPr lang="en-US" dirty="0"/>
-              <a:t>Published as viable alternative to Git Flow &amp; GitHub Flow</a:t>
-            </a:r>
-          </a:p>
-          <a:p>
-            <a:pPr lvl="1"/>
-            <a:r>
-              <a:rPr lang="en-US" dirty="0"/>
-              <a:t>Semi-structured release schedule</a:t>
-            </a:r>
-          </a:p>
-          <a:p>
-            <a:pPr lvl="1"/>
-            <a:r>
-              <a:rPr lang="en-US" dirty="0"/>
-              <a:t>Workflow that simplifies difficulties and common failures in synchronizing infinite lifetime branches</a:t>
-            </a:r>
-          </a:p>
-          <a:p>
-            <a:pPr marL="346075" lvl="1" indent="0">
-              <a:buNone/>
-            </a:pPr>
-            <a:endParaRPr lang="en-US" dirty="0"/>
-          </a:p>
-          <a:p>
-            <a:pPr marL="0" indent="0">
-              <a:buNone/>
-            </a:pPr>
-            <a:r>
-              <a:rPr lang="en-US" dirty="0"/>
-              <a:t>Key Ideas</a:t>
-            </a:r>
-          </a:p>
-          <a:p>
-            <a:r>
-              <a:rPr lang="en-US" sz="2000" dirty="0"/>
-              <a:t>main branch is staging area</a:t>
-            </a:r>
-          </a:p>
-          <a:p>
-            <a:r>
-              <a:rPr lang="en-US" sz="2000" dirty="0"/>
-              <a:t>Mature code in main flows downstream into pre-production &amp; production infinite lifetime branches</a:t>
-            </a:r>
-          </a:p>
-          <a:p>
-            <a:r>
-              <a:rPr lang="en-US" sz="2000" dirty="0"/>
-              <a:t>Allow for release branches with downstream flow</a:t>
-            </a:r>
-          </a:p>
-          <a:p>
-            <a:pPr lvl="1"/>
-            <a:r>
-              <a:rPr lang="en-US" dirty="0"/>
-              <a:t>Fixes made upstream &amp; merged into main.</a:t>
-            </a:r>
-          </a:p>
-          <a:p>
-            <a:pPr lvl="1"/>
-            <a:r>
-              <a:rPr lang="en-US" dirty="0"/>
-              <a:t>Fixes cherry picked into release branch</a:t>
-            </a:r>
-          </a:p>
-          <a:p>
-            <a:pPr marL="0" indent="0">
-              <a:buNone/>
-            </a:pPr>
-            <a:endParaRPr lang="en-US" dirty="0"/>
-          </a:p>
-          <a:p>
-            <a:endParaRPr lang="en-US" dirty="0"/>
+              <a:t>Git extensions</a:t>
+            </a:r>
+            <a:r>
+              <a:rPr lang="en-US" dirty="0"/>
+              <a:t> to enforce policy</a:t>
+            </a:r>
+          </a:p>
+          <a:p>
+            <a:pPr marL="285750" indent="-285750">
+              <a:buFont typeface="Arial" panose="020B0604020202020204" pitchFamily="34" charset="0"/>
+              <a:buChar char="•"/>
+            </a:pPr>
+            <a:r>
+              <a:rPr lang="en-US" dirty="0"/>
+              <a:t>How are develop and main synchronized?</a:t>
+            </a:r>
+          </a:p>
+          <a:p>
+            <a:pPr marL="285750" indent="-285750">
+              <a:buFont typeface="Arial" panose="020B0604020202020204" pitchFamily="34" charset="0"/>
+              <a:buChar char="•"/>
+            </a:pPr>
+            <a:r>
+              <a:rPr lang="en-US" dirty="0"/>
+              <a:t>Where do merge conflicts occur and how are they resolved?</a:t>
+            </a:r>
+          </a:p>
+        </p:txBody>
+      </p:sp>
+      <p:sp>
+        <p:nvSpPr>
+          <p:cNvPr id="7" name="TextBox 6">
+            <a:extLst>
+              <a:ext uri="{FF2B5EF4-FFF2-40B4-BE49-F238E27FC236}">
+                <a16:creationId xmlns:a16="http://schemas.microsoft.com/office/drawing/2014/main" id="{9EA3B929-9425-9A46-9997-AAEB3D2077BD}"/>
+              </a:ext>
+            </a:extLst>
+          </p:cNvPr>
+          <p:cNvSpPr txBox="1"/>
+          <p:nvPr/>
+        </p:nvSpPr>
+        <p:spPr>
+          <a:xfrm>
+            <a:off x="4891407" y="4758347"/>
+            <a:ext cx="7297418" cy="849463"/>
+          </a:xfrm>
+          <a:prstGeom prst="rect">
+            <a:avLst/>
+          </a:prstGeom>
+          <a:noFill/>
+        </p:spPr>
+        <p:txBody>
+          <a:bodyPr wrap="square" lIns="118872" tIns="91440" rIns="118872" bIns="91440" rtlCol="0" anchor="ctr" anchorCtr="0">
+            <a:spAutoFit/>
+          </a:bodyPr>
+          <a:lstStyle/>
+          <a:p>
+            <a:pPr algn="l">
+              <a:lnSpc>
+                <a:spcPct val="90000"/>
+              </a:lnSpc>
+            </a:pPr>
+            <a:r>
+              <a:rPr lang="en-US" sz="1600" b="1" dirty="0"/>
+              <a:t>Author: </a:t>
+            </a:r>
+            <a:r>
+              <a:rPr lang="en-US" sz="1600" dirty="0"/>
+              <a:t>Vincent Driessen</a:t>
+            </a:r>
+          </a:p>
+          <a:p>
+            <a:pPr>
+              <a:lnSpc>
+                <a:spcPct val="90000"/>
+              </a:lnSpc>
+            </a:pPr>
+            <a:r>
+              <a:rPr lang="en-US" sz="1600" b="1" dirty="0"/>
+              <a:t>Original Blog: </a:t>
+            </a:r>
+            <a:r>
+              <a:rPr lang="en-US" sz="1600" b="1" dirty="0">
+                <a:hlinkClick r:id="rId4"/>
+              </a:rPr>
+              <a:t>https://nvie.com/posts/a-successful-git-branching-model/</a:t>
+            </a:r>
+            <a:endParaRPr lang="en-US" sz="1600" b="1" dirty="0"/>
+          </a:p>
+          <a:p>
+            <a:pPr>
+              <a:lnSpc>
+                <a:spcPct val="90000"/>
+              </a:lnSpc>
+            </a:pPr>
+            <a:r>
+              <a:rPr lang="en-US" sz="1600" b="1" dirty="0"/>
+              <a:t>License: </a:t>
+            </a:r>
+            <a:r>
+              <a:rPr lang="en-US" sz="1600" dirty="0"/>
+              <a:t>Creative Commons </a:t>
+            </a:r>
+            <a:endParaRPr lang="en-US" sz="1600" b="1" dirty="0"/>
+          </a:p>
+        </p:txBody>
+      </p:sp>
+      <p:pic>
+        <p:nvPicPr>
+          <p:cNvPr id="8" name="Picture 7">
+            <a:extLst>
+              <a:ext uri="{FF2B5EF4-FFF2-40B4-BE49-F238E27FC236}">
+                <a16:creationId xmlns:a16="http://schemas.microsoft.com/office/drawing/2014/main" id="{AE3E601E-116A-0D4A-B3F6-EB5C127C6164}"/>
+              </a:ext>
+            </a:extLst>
+          </p:cNvPr>
+          <p:cNvPicPr>
+            <a:picLocks noChangeAspect="1"/>
+          </p:cNvPicPr>
+          <p:nvPr/>
+        </p:nvPicPr>
+        <p:blipFill>
+          <a:blip r:embed="rId5"/>
+          <a:stretch>
+            <a:fillRect/>
+          </a:stretch>
+        </p:blipFill>
+        <p:spPr>
+          <a:xfrm>
+            <a:off x="7705346" y="5408603"/>
+            <a:ext cx="1356767" cy="323577"/>
+          </a:xfrm>
+          <a:prstGeom prst="rect">
+            <a:avLst/>
+          </a:prstGeom>
+        </p:spPr>
+      </p:pic>
+      <p:pic>
+        <p:nvPicPr>
+          <p:cNvPr id="4" name="Picture 3">
+            <a:extLst>
+              <a:ext uri="{FF2B5EF4-FFF2-40B4-BE49-F238E27FC236}">
+                <a16:creationId xmlns:a16="http://schemas.microsoft.com/office/drawing/2014/main" id="{33B98FB3-53C2-B047-8060-0D102CF59E21}"/>
+              </a:ext>
+            </a:extLst>
+          </p:cNvPr>
+          <p:cNvPicPr>
+            <a:picLocks noChangeAspect="1"/>
+          </p:cNvPicPr>
+          <p:nvPr/>
+        </p:nvPicPr>
+        <p:blipFill>
+          <a:blip r:embed="rId6" cstate="print">
+            <a:extLst>
+              <a:ext uri="{28A0092B-C50C-407E-A947-70E740481C1C}">
+                <a14:useLocalDpi xmlns:a14="http://schemas.microsoft.com/office/drawing/2010/main" val="0"/>
+              </a:ext>
+            </a:extLst>
+          </a:blip>
+          <a:stretch>
+            <a:fillRect/>
+          </a:stretch>
+        </p:blipFill>
+        <p:spPr>
+          <a:xfrm>
+            <a:off x="408175" y="665457"/>
+            <a:ext cx="4506732" cy="6008976"/>
+          </a:xfrm>
+          <a:prstGeom prst="rect">
+            <a:avLst/>
+          </a:prstGeom>
+        </p:spPr>
+      </p:pic>
+      <p:sp>
+        <p:nvSpPr>
+          <p:cNvPr id="9" name="TextBox 8">
+            <a:extLst>
+              <a:ext uri="{FF2B5EF4-FFF2-40B4-BE49-F238E27FC236}">
+                <a16:creationId xmlns:a16="http://schemas.microsoft.com/office/drawing/2014/main" id="{2802D390-BEBC-A647-AFDC-5E606EA03997}"/>
+              </a:ext>
+            </a:extLst>
+          </p:cNvPr>
+          <p:cNvSpPr txBox="1"/>
+          <p:nvPr/>
+        </p:nvSpPr>
+        <p:spPr>
+          <a:xfrm>
+            <a:off x="3828641" y="730444"/>
+            <a:ext cx="822960" cy="295466"/>
+          </a:xfrm>
+          <a:prstGeom prst="rect">
+            <a:avLst/>
+          </a:prstGeom>
+          <a:solidFill>
+            <a:schemeClr val="bg1"/>
+          </a:solidFill>
+        </p:spPr>
+        <p:txBody>
+          <a:bodyPr wrap="square" lIns="118872" tIns="91440" rIns="118872" bIns="91440" rtlCol="0" anchor="ctr" anchorCtr="0">
+            <a:spAutoFit/>
+          </a:bodyPr>
+          <a:lstStyle/>
+          <a:p>
+            <a:pPr algn="l">
+              <a:lnSpc>
+                <a:spcPct val="90000"/>
+              </a:lnSpc>
+            </a:pPr>
+            <a:r>
+              <a:rPr lang="en-US" sz="800" b="1" dirty="0"/>
+              <a:t>  main  </a:t>
+            </a:r>
           </a:p>
         </p:txBody>
       </p:sp>
     </p:spTree>
     <p:extLst>
       <p:ext uri="{BB962C8B-B14F-4D97-AF65-F5344CB8AC3E}">
-        <p14:creationId xmlns:p14="http://schemas.microsoft.com/office/powerpoint/2010/main" val="3212859505"/>
+        <p14:creationId xmlns:p14="http://schemas.microsoft.com/office/powerpoint/2010/main" val="1539049706"/>
       </p:ext>
     </p:extLst>
   </p:cSld>
@@ -9036,7 +9161,7 @@
           <p:cNvPr id="2" name="Title 1">
             <a:extLst>
               <a:ext uri="{FF2B5EF4-FFF2-40B4-BE49-F238E27FC236}">
-                <a16:creationId xmlns:a16="http://schemas.microsoft.com/office/drawing/2014/main" id="{F07038E7-EEB4-9043-9EA1-7BA9EA5F3241}"/>
+                <a16:creationId xmlns:a16="http://schemas.microsoft.com/office/drawing/2014/main" id="{BD4BD5A9-082D-C54B-8AB5-B9AB79871188}"/>
               </a:ext>
             </a:extLst>
           </p:cNvPr>
@@ -9054,7 +9179,7 @@
           <a:p>
             <a:r>
               <a:rPr lang="en-US" dirty="0"/>
-              <a:t>Collaboration using Git Workflows for CSE projects</a:t>
+              <a:t>GitHub Flow</a:t>
             </a:r>
           </a:p>
         </p:txBody>
@@ -9064,7 +9189,7 @@
           <p:cNvPr id="3" name="Content Placeholder 2">
             <a:extLst>
               <a:ext uri="{FF2B5EF4-FFF2-40B4-BE49-F238E27FC236}">
-                <a16:creationId xmlns:a16="http://schemas.microsoft.com/office/drawing/2014/main" id="{BC4025A8-D322-7F4C-BD72-C65AC6A3E843}"/>
+                <a16:creationId xmlns:a16="http://schemas.microsoft.com/office/drawing/2014/main" id="{8B010D1E-98D6-8143-8514-9CB3935A6D58}"/>
               </a:ext>
             </a:extLst>
           </p:cNvPr>
@@ -9077,7 +9202,7 @@
         </p:nvSpPr>
         <p:spPr>
           <a:xfrm>
-            <a:off x="365760" y="868680"/>
+            <a:off x="368424" y="1197717"/>
             <a:ext cx="11369809" cy="4047778"/>
           </a:xfrm>
         </p:spPr>
@@ -9088,46 +9213,110 @@
             <a:pPr marL="0" indent="0">
               <a:buNone/>
             </a:pPr>
+            <a:r>
+              <a:rPr lang="en-US" dirty="0">
+                <a:hlinkClick r:id="rId3"/>
+              </a:rPr>
+              <a:t>http://scottchacon.com/2011/08/31/github-flow.html</a:t>
+            </a:r>
             <a:endParaRPr lang="en-US" dirty="0"/>
           </a:p>
           <a:p>
-            <a:r>
-              <a:rPr lang="en-US" dirty="0" err="1"/>
-              <a:t>Trilionos</a:t>
-            </a:r>
-            <a:r>
-              <a:rPr lang="en-US" dirty="0"/>
-              <a:t> Workflow</a:t>
-            </a:r>
-          </a:p>
-          <a:p>
-            <a:r>
-              <a:rPr lang="en-US" dirty="0"/>
-              <a:t>Open MPI Workflow</a:t>
-            </a:r>
-          </a:p>
-          <a:p>
-            <a:r>
-              <a:rPr lang="en-US" dirty="0" err="1"/>
-              <a:t>Flecsi</a:t>
-            </a:r>
-            <a:r>
-              <a:rPr lang="en-US" dirty="0"/>
-              <a:t> Workflow</a:t>
-            </a:r>
-          </a:p>
-          <a:p>
-            <a:pPr marL="0" indent="0">
+            <a:pPr lvl="1"/>
+            <a:r>
+              <a:rPr lang="en-US" dirty="0"/>
+              <a:t>Published as viable alternative to Git Flow</a:t>
+            </a:r>
+          </a:p>
+          <a:p>
+            <a:pPr lvl="1"/>
+            <a:r>
+              <a:rPr lang="en-US" dirty="0"/>
+              <a:t>No structured release schedule</a:t>
+            </a:r>
+          </a:p>
+          <a:p>
+            <a:pPr lvl="1"/>
+            <a:r>
+              <a:rPr lang="en-US" dirty="0"/>
+              <a:t>Continuous deployment &amp; continuous integration allows for simpler workflow</a:t>
+            </a:r>
+          </a:p>
+          <a:p>
+            <a:pPr marL="346075" lvl="1" indent="0">
               <a:buNone/>
             </a:pPr>
             <a:endParaRPr lang="en-US" dirty="0"/>
+          </a:p>
+          <a:p>
+            <a:pPr marL="0" indent="-49212">
+              <a:buNone/>
+            </a:pPr>
+            <a:r>
+              <a:rPr lang="en-US" dirty="0"/>
+              <a:t>Key Ideas</a:t>
+            </a:r>
+          </a:p>
+          <a:p>
+            <a:pPr marL="457200" indent="-457200">
+              <a:buFont typeface="+mj-lt"/>
+              <a:buAutoNum type="arabicPeriod"/>
+            </a:pPr>
+            <a:r>
+              <a:rPr lang="en-US" sz="2000" dirty="0"/>
+              <a:t>All commits in the main branch are </a:t>
+            </a:r>
+            <a:r>
+              <a:rPr lang="en-US" sz="2000" b="1" dirty="0"/>
+              <a:t>deployable</a:t>
+            </a:r>
+          </a:p>
+          <a:p>
+            <a:pPr marL="457200" indent="-457200">
+              <a:buFont typeface="+mj-lt"/>
+              <a:buAutoNum type="arabicPeriod"/>
+            </a:pPr>
+            <a:r>
+              <a:rPr lang="en-US" sz="2000" dirty="0"/>
+              <a:t>Base feature branches off of main</a:t>
+            </a:r>
+          </a:p>
+          <a:p>
+            <a:pPr marL="457200" indent="-457200">
+              <a:buFont typeface="+mj-lt"/>
+              <a:buAutoNum type="arabicPeriod"/>
+            </a:pPr>
+            <a:r>
+              <a:rPr lang="en-US" sz="2000" dirty="0"/>
+              <a:t>Push local repository to remote constantly</a:t>
+            </a:r>
+          </a:p>
+          <a:p>
+            <a:pPr marL="457200" indent="-457200">
+              <a:buFont typeface="+mj-lt"/>
+              <a:buAutoNum type="arabicPeriod"/>
+            </a:pPr>
+            <a:r>
+              <a:rPr lang="en-US" sz="2000" dirty="0"/>
+              <a:t>Open Pull Requests early to start dialogue</a:t>
+            </a:r>
+          </a:p>
+          <a:p>
+            <a:pPr marL="457200" indent="-457200">
+              <a:buFont typeface="+mj-lt"/>
+              <a:buAutoNum type="arabicPeriod"/>
+            </a:pPr>
+            <a:r>
+              <a:rPr lang="en-US" sz="2000" dirty="0"/>
+              <a:t>Merge into main after Pull Request review </a:t>
+            </a:r>
           </a:p>
         </p:txBody>
       </p:sp>
     </p:spTree>
     <p:extLst>
       <p:ext uri="{BB962C8B-B14F-4D97-AF65-F5344CB8AC3E}">
-        <p14:creationId xmlns:p14="http://schemas.microsoft.com/office/powerpoint/2010/main" val="64054294"/>
+        <p14:creationId xmlns:p14="http://schemas.microsoft.com/office/powerpoint/2010/main" val="3917958728"/>
       </p:ext>
     </p:extLst>
   </p:cSld>
@@ -9159,6 +9348,303 @@
           <p:cNvPr id="2" name="Title 1">
             <a:extLst>
               <a:ext uri="{FF2B5EF4-FFF2-40B4-BE49-F238E27FC236}">
+                <a16:creationId xmlns:a16="http://schemas.microsoft.com/office/drawing/2014/main" id="{BD4BD5A9-082D-C54B-8AB5-B9AB79871188}"/>
+              </a:ext>
+            </a:extLst>
+          </p:cNvPr>
+          <p:cNvSpPr>
+            <a:spLocks noGrp="1"/>
+          </p:cNvSpPr>
+          <p:nvPr>
+            <p:ph type="title"/>
+          </p:nvPr>
+        </p:nvSpPr>
+        <p:spPr/>
+        <p:txBody>
+          <a:bodyPr/>
+          <a:lstStyle/>
+          <a:p>
+            <a:r>
+              <a:rPr lang="en-US" dirty="0"/>
+              <a:t>GitLab Flow</a:t>
+            </a:r>
+          </a:p>
+        </p:txBody>
+      </p:sp>
+      <p:sp>
+        <p:nvSpPr>
+          <p:cNvPr id="3" name="Content Placeholder 2">
+            <a:extLst>
+              <a:ext uri="{FF2B5EF4-FFF2-40B4-BE49-F238E27FC236}">
+                <a16:creationId xmlns:a16="http://schemas.microsoft.com/office/drawing/2014/main" id="{8B010D1E-98D6-8143-8514-9CB3935A6D58}"/>
+              </a:ext>
+            </a:extLst>
+          </p:cNvPr>
+          <p:cNvSpPr>
+            <a:spLocks noGrp="1"/>
+          </p:cNvSpPr>
+          <p:nvPr>
+            <p:ph idx="1"/>
+          </p:nvPr>
+        </p:nvSpPr>
+        <p:spPr>
+          <a:xfrm>
+            <a:off x="365761" y="1212707"/>
+            <a:ext cx="10067394" cy="4047778"/>
+          </a:xfrm>
+        </p:spPr>
+        <p:txBody>
+          <a:bodyPr/>
+          <a:lstStyle/>
+          <a:p>
+            <a:pPr marL="0" indent="0">
+              <a:buNone/>
+            </a:pPr>
+            <a:r>
+              <a:rPr lang="en-US" dirty="0">
+                <a:hlinkClick r:id="rId3"/>
+              </a:rPr>
+              <a:t>https://docs.gitlab.com/ee/workflow/gitlab_flow.html</a:t>
+            </a:r>
+            <a:endParaRPr lang="en-US" dirty="0"/>
+          </a:p>
+          <a:p>
+            <a:pPr lvl="1"/>
+            <a:r>
+              <a:rPr lang="en-US" dirty="0"/>
+              <a:t>Published as viable alternative to Git Flow &amp; GitHub Flow</a:t>
+            </a:r>
+          </a:p>
+          <a:p>
+            <a:pPr lvl="1"/>
+            <a:r>
+              <a:rPr lang="en-US" dirty="0"/>
+              <a:t>Semi-structured release schedule</a:t>
+            </a:r>
+          </a:p>
+          <a:p>
+            <a:pPr lvl="1"/>
+            <a:r>
+              <a:rPr lang="en-US" dirty="0"/>
+              <a:t>Workflow that simplifies difficulties and common failures in synchronizing infinite lifetime branches</a:t>
+            </a:r>
+          </a:p>
+          <a:p>
+            <a:pPr marL="346075" lvl="1" indent="0">
+              <a:buNone/>
+            </a:pPr>
+            <a:endParaRPr lang="en-US" dirty="0"/>
+          </a:p>
+          <a:p>
+            <a:pPr marL="0" indent="0">
+              <a:buNone/>
+            </a:pPr>
+            <a:r>
+              <a:rPr lang="en-US" dirty="0"/>
+              <a:t>Key Ideas</a:t>
+            </a:r>
+          </a:p>
+          <a:p>
+            <a:r>
+              <a:rPr lang="en-US" sz="2000" dirty="0"/>
+              <a:t>main branch is staging area</a:t>
+            </a:r>
+          </a:p>
+          <a:p>
+            <a:r>
+              <a:rPr lang="en-US" sz="2000" dirty="0"/>
+              <a:t>Mature code in main flows downstream into pre-production &amp; production infinite lifetime branches</a:t>
+            </a:r>
+          </a:p>
+          <a:p>
+            <a:r>
+              <a:rPr lang="en-US" sz="2000" dirty="0"/>
+              <a:t>Allow for release branches with downstream flow</a:t>
+            </a:r>
+          </a:p>
+          <a:p>
+            <a:pPr lvl="1"/>
+            <a:r>
+              <a:rPr lang="en-US" dirty="0"/>
+              <a:t>Fixes made upstream &amp; merged into main.</a:t>
+            </a:r>
+          </a:p>
+          <a:p>
+            <a:pPr lvl="1"/>
+            <a:r>
+              <a:rPr lang="en-US" dirty="0"/>
+              <a:t>Fixes cherry picked into release branch</a:t>
+            </a:r>
+          </a:p>
+          <a:p>
+            <a:pPr marL="0" indent="0">
+              <a:buNone/>
+            </a:pPr>
+            <a:endParaRPr lang="en-US" dirty="0"/>
+          </a:p>
+          <a:p>
+            <a:endParaRPr lang="en-US" dirty="0"/>
+          </a:p>
+        </p:txBody>
+      </p:sp>
+    </p:spTree>
+    <p:extLst>
+      <p:ext uri="{BB962C8B-B14F-4D97-AF65-F5344CB8AC3E}">
+        <p14:creationId xmlns:p14="http://schemas.microsoft.com/office/powerpoint/2010/main" val="3212859505"/>
+      </p:ext>
+    </p:extLst>
+  </p:cSld>
+  <p:clrMapOvr>
+    <a:masterClrMapping/>
+  </p:clrMapOvr>
+</p:sld>
+</file>
+
+<file path=ppt/slides/slide22.xml><?xml version="1.0" encoding="utf-8"?>
+<p:sld xmlns:a="http://schemas.openxmlformats.org/drawingml/2006/main" xmlns:r="http://schemas.openxmlformats.org/officeDocument/2006/relationships" xmlns:p="http://schemas.openxmlformats.org/presentationml/2006/main">
+  <p:cSld>
+    <p:spTree>
+      <p:nvGrpSpPr>
+        <p:cNvPr id="1" name=""/>
+        <p:cNvGrpSpPr/>
+        <p:nvPr/>
+      </p:nvGrpSpPr>
+      <p:grpSpPr>
+        <a:xfrm>
+          <a:off x="0" y="0"/>
+          <a:ext cx="0" cy="0"/>
+          <a:chOff x="0" y="0"/>
+          <a:chExt cx="0" cy="0"/>
+        </a:xfrm>
+      </p:grpSpPr>
+      <p:sp>
+        <p:nvSpPr>
+          <p:cNvPr id="2" name="Title 1">
+            <a:extLst>
+              <a:ext uri="{FF2B5EF4-FFF2-40B4-BE49-F238E27FC236}">
+                <a16:creationId xmlns:a16="http://schemas.microsoft.com/office/drawing/2014/main" id="{F07038E7-EEB4-9043-9EA1-7BA9EA5F3241}"/>
+              </a:ext>
+            </a:extLst>
+          </p:cNvPr>
+          <p:cNvSpPr>
+            <a:spLocks noGrp="1"/>
+          </p:cNvSpPr>
+          <p:nvPr>
+            <p:ph type="title"/>
+          </p:nvPr>
+        </p:nvSpPr>
+        <p:spPr/>
+        <p:txBody>
+          <a:bodyPr/>
+          <a:lstStyle/>
+          <a:p>
+            <a:r>
+              <a:rPr lang="en-US" dirty="0"/>
+              <a:t>Collaboration using Git Workflows for CSE projects</a:t>
+            </a:r>
+          </a:p>
+        </p:txBody>
+      </p:sp>
+      <p:sp>
+        <p:nvSpPr>
+          <p:cNvPr id="3" name="Content Placeholder 2">
+            <a:extLst>
+              <a:ext uri="{FF2B5EF4-FFF2-40B4-BE49-F238E27FC236}">
+                <a16:creationId xmlns:a16="http://schemas.microsoft.com/office/drawing/2014/main" id="{BC4025A8-D322-7F4C-BD72-C65AC6A3E843}"/>
+              </a:ext>
+            </a:extLst>
+          </p:cNvPr>
+          <p:cNvSpPr>
+            <a:spLocks noGrp="1"/>
+          </p:cNvSpPr>
+          <p:nvPr>
+            <p:ph idx="1"/>
+          </p:nvPr>
+        </p:nvSpPr>
+        <p:spPr>
+          <a:xfrm>
+            <a:off x="365760" y="868680"/>
+            <a:ext cx="11369809" cy="4047778"/>
+          </a:xfrm>
+        </p:spPr>
+        <p:txBody>
+          <a:bodyPr/>
+          <a:lstStyle/>
+          <a:p>
+            <a:pPr marL="0" indent="0">
+              <a:buNone/>
+            </a:pPr>
+            <a:endParaRPr lang="en-US" dirty="0"/>
+          </a:p>
+          <a:p>
+            <a:r>
+              <a:rPr lang="en-US" dirty="0" err="1"/>
+              <a:t>Trilionos</a:t>
+            </a:r>
+            <a:r>
+              <a:rPr lang="en-US" dirty="0"/>
+              <a:t> Workflow</a:t>
+            </a:r>
+          </a:p>
+          <a:p>
+            <a:r>
+              <a:rPr lang="en-US" dirty="0"/>
+              <a:t>Open MPI Workflow</a:t>
+            </a:r>
+          </a:p>
+          <a:p>
+            <a:r>
+              <a:rPr lang="en-US" dirty="0" err="1"/>
+              <a:t>Flecsi</a:t>
+            </a:r>
+            <a:r>
+              <a:rPr lang="en-US" dirty="0"/>
+              <a:t> Workflow</a:t>
+            </a:r>
+          </a:p>
+          <a:p>
+            <a:pPr marL="0" indent="0">
+              <a:buNone/>
+            </a:pPr>
+            <a:endParaRPr lang="en-US" dirty="0"/>
+          </a:p>
+        </p:txBody>
+      </p:sp>
+    </p:spTree>
+    <p:extLst>
+      <p:ext uri="{BB962C8B-B14F-4D97-AF65-F5344CB8AC3E}">
+        <p14:creationId xmlns:p14="http://schemas.microsoft.com/office/powerpoint/2010/main" val="64054294"/>
+      </p:ext>
+    </p:extLst>
+  </p:cSld>
+  <p:clrMapOvr>
+    <a:masterClrMapping/>
+  </p:clrMapOvr>
+</p:sld>
+</file>
+
+<file path=ppt/slides/slide23.xml><?xml version="1.0" encoding="utf-8"?>
+<p:sld xmlns:a="http://schemas.openxmlformats.org/drawingml/2006/main" xmlns:r="http://schemas.openxmlformats.org/officeDocument/2006/relationships" xmlns:p="http://schemas.openxmlformats.org/presentationml/2006/main">
+  <p:cSld>
+    <p:spTree>
+      <p:nvGrpSpPr>
+        <p:cNvPr id="1" name=""/>
+        <p:cNvGrpSpPr/>
+        <p:nvPr/>
+      </p:nvGrpSpPr>
+      <p:grpSpPr>
+        <a:xfrm>
+          <a:off x="0" y="0"/>
+          <a:ext cx="0" cy="0"/>
+          <a:chOff x="0" y="0"/>
+          <a:chExt cx="0" cy="0"/>
+        </a:xfrm>
+      </p:grpSpPr>
+      <p:sp>
+        <p:nvSpPr>
+          <p:cNvPr id="2" name="Title 1">
+            <a:extLst>
+              <a:ext uri="{FF2B5EF4-FFF2-40B4-BE49-F238E27FC236}">
                 <a16:creationId xmlns:a16="http://schemas.microsoft.com/office/drawing/2014/main" id="{9E61C7ED-2A46-3949-B59E-F7D19B5D57B0}"/>
               </a:ext>
             </a:extLst>
@@ -10430,7 +10916,7 @@
 </p:sld>
 </file>
 
-<file path=ppt/slides/slide22.xml><?xml version="1.0" encoding="utf-8"?>
+<file path=ppt/slides/slide24.xml><?xml version="1.0" encoding="utf-8"?>
 <p:sld xmlns:a="http://schemas.openxmlformats.org/drawingml/2006/main" xmlns:r="http://schemas.openxmlformats.org/officeDocument/2006/relationships" xmlns:p="http://schemas.openxmlformats.org/presentationml/2006/main">
   <p:cSld>
     <p:spTree>
@@ -12042,7 +12528,7 @@
 </p:sld>
 </file>
 
-<file path=ppt/slides/slide23.xml><?xml version="1.0" encoding="utf-8"?>
+<file path=ppt/slides/slide25.xml><?xml version="1.0" encoding="utf-8"?>
 <p:sld xmlns:a="http://schemas.openxmlformats.org/drawingml/2006/main" xmlns:r="http://schemas.openxmlformats.org/officeDocument/2006/relationships" xmlns:p="http://schemas.openxmlformats.org/presentationml/2006/main">
   <p:cSld>
     <p:spTree>
@@ -12679,7 +13165,7 @@
 </p:sld>
 </file>
 
-<file path=ppt/slides/slide24.xml><?xml version="1.0" encoding="utf-8"?>
+<file path=ppt/slides/slide26.xml><?xml version="1.0" encoding="utf-8"?>
 <p:sld xmlns:a="http://schemas.openxmlformats.org/drawingml/2006/main" xmlns:r="http://schemas.openxmlformats.org/officeDocument/2006/relationships" xmlns:p="http://schemas.openxmlformats.org/presentationml/2006/main">
   <p:cSld>
     <p:spTree>
@@ -12957,16 +13443,13 @@
           <a:p>
             <a:r>
               <a:rPr lang="en-US" dirty="0"/>
-              <a:t>Code Review </a:t>
-            </a:r>
-            <a:r>
-              <a:rPr lang="en-US" dirty="0">
-                <a:solidFill>
-                  <a:schemeClr val="accent4"/>
-                </a:solidFill>
-              </a:rPr>
-              <a:t>TBD</a:t>
-            </a:r>
+              <a:t>Code Review</a:t>
+            </a:r>
+            <a:endParaRPr lang="en-US" dirty="0">
+              <a:solidFill>
+                <a:schemeClr val="accent4"/>
+              </a:solidFill>
+            </a:endParaRPr>
           </a:p>
           <a:p>
             <a:r>
@@ -15542,6 +16025,12 @@
 </file>
 
 <file path=customXml/item1.xml><?xml version="1.0" encoding="utf-8"?>
+<p:properties xmlns:p="http://schemas.microsoft.com/office/2006/metadata/properties" xmlns:xsi="http://www.w3.org/2001/XMLSchema-instance" xmlns:pc="http://schemas.microsoft.com/office/infopath/2007/PartnerControls">
+  <documentManagement/>
+</p:properties>
+</file>
+
+<file path=customXml/item2.xml><?xml version="1.0" encoding="utf-8"?>
 <?mso-contentType ?>
 <FormTemplates xmlns="http://schemas.microsoft.com/sharepoint/v3/contenttype/forms">
   <Display>DocumentLibraryForm</Display>
@@ -15550,7 +16039,7 @@
 </FormTemplates>
 </file>
 
-<file path=customXml/item2.xml><?xml version="1.0" encoding="utf-8"?>
+<file path=customXml/item3.xml><?xml version="1.0" encoding="utf-8"?>
 <ct:contentTypeSchema xmlns:ct="http://schemas.microsoft.com/office/2006/metadata/contentType" xmlns:ma="http://schemas.microsoft.com/office/2006/metadata/properties/metaAttributes" ct:_="" ma:_="" ma:contentTypeName="Document" ma:contentTypeID="0x010100565464437F680748A68B85EB6594EA7D" ma:contentTypeVersion="0" ma:contentTypeDescription="Create a new document." ma:contentTypeScope="" ma:versionID="fe3f4dd58d5914c51cfc6deaa8ad845c">
   <xsd:schema xmlns:xsd="http://www.w3.org/2001/XMLSchema" xmlns:p="http://schemas.microsoft.com/office/2006/metadata/properties" targetNamespace="http://schemas.microsoft.com/office/2006/metadata/properties" ma:root="true" ma:fieldsID="4aeb20c0e3442673af7ee10786458764">
     <xsd:element name="properties">
@@ -15599,13 +16088,22 @@
 </ct:contentTypeSchema>
 </file>
 
-<file path=customXml/item3.xml><?xml version="1.0" encoding="utf-8"?>
-<p:properties xmlns:p="http://schemas.microsoft.com/office/2006/metadata/properties" xmlns:xsi="http://www.w3.org/2001/XMLSchema-instance" xmlns:pc="http://schemas.microsoft.com/office/infopath/2007/PartnerControls">
-  <documentManagement/>
-</p:properties>
+<file path=customXml/itemProps1.xml><?xml version="1.0" encoding="utf-8"?>
+<ds:datastoreItem xmlns:ds="http://schemas.openxmlformats.org/officeDocument/2006/customXml" ds:itemID="{A50EC660-24D0-43A0-AE5E-E274115E726B}">
+  <ds:schemaRefs>
+    <ds:schemaRef ds:uri="http://purl.org/dc/elements/1.1/"/>
+    <ds:schemaRef ds:uri="http://schemas.microsoft.com/office/2006/metadata/properties"/>
+    <ds:schemaRef ds:uri="http://purl.org/dc/terms/"/>
+    <ds:schemaRef ds:uri="http://schemas.openxmlformats.org/package/2006/metadata/core-properties"/>
+    <ds:schemaRef ds:uri="http://schemas.microsoft.com/office/2006/documentManagement/types"/>
+    <ds:schemaRef ds:uri="http://www.w3.org/XML/1998/namespace"/>
+    <ds:schemaRef ds:uri="http://purl.org/dc/dcmitype/"/>
+    <ds:schemaRef ds:uri="http://schemas.microsoft.com/office/infopath/2007/PartnerControls"/>
+  </ds:schemaRefs>
+</ds:datastoreItem>
 </file>
 
-<file path=customXml/itemProps1.xml><?xml version="1.0" encoding="utf-8"?>
+<file path=customXml/itemProps2.xml><?xml version="1.0" encoding="utf-8"?>
 <ds:datastoreItem xmlns:ds="http://schemas.openxmlformats.org/officeDocument/2006/customXml" ds:itemID="{19E20559-B232-4371-8690-E3D8007EDB82}">
   <ds:schemaRefs>
     <ds:schemaRef ds:uri="http://schemas.microsoft.com/sharepoint/v3/contenttype/forms"/>
@@ -15613,7 +16111,7 @@
 </ds:datastoreItem>
 </file>
 
-<file path=customXml/itemProps2.xml><?xml version="1.0" encoding="utf-8"?>
+<file path=customXml/itemProps3.xml><?xml version="1.0" encoding="utf-8"?>
 <ds:datastoreItem xmlns:ds="http://schemas.openxmlformats.org/officeDocument/2006/customXml" ds:itemID="{E8DB7DEB-074E-4EE8-9B6E-FD277323109C}">
   <ds:schemaRefs>
     <ds:schemaRef ds:uri="http://schemas.microsoft.com/office/2006/metadata/contentType"/>
@@ -15626,19 +16124,4 @@
     <ds:schemaRef ds:uri="http://schemas.microsoft.com/office/internal/2005/internalDocumentation"/>
   </ds:schemaRefs>
 </ds:datastoreItem>
-</file>
-
-<file path=customXml/itemProps3.xml><?xml version="1.0" encoding="utf-8"?>
-<ds:datastoreItem xmlns:ds="http://schemas.openxmlformats.org/officeDocument/2006/customXml" ds:itemID="{A50EC660-24D0-43A0-AE5E-E274115E726B}">
-  <ds:schemaRefs>
-    <ds:schemaRef ds:uri="http://purl.org/dc/elements/1.1/"/>
-    <ds:schemaRef ds:uri="http://schemas.microsoft.com/office/2006/metadata/properties"/>
-    <ds:schemaRef ds:uri="http://purl.org/dc/terms/"/>
-    <ds:schemaRef ds:uri="http://schemas.openxmlformats.org/package/2006/metadata/core-properties"/>
-    <ds:schemaRef ds:uri="http://schemas.microsoft.com/office/2006/documentManagement/types"/>
-    <ds:schemaRef ds:uri="http://www.w3.org/XML/1998/namespace"/>
-    <ds:schemaRef ds:uri="http://purl.org/dc/dcmitype/"/>
-    <ds:schemaRef ds:uri="http://schemas.microsoft.com/office/infopath/2007/PartnerControls"/>
-  </ds:schemaRefs>
-</ds:datastoreItem>
 </file>
</xml_diff>

<commit_message>
Update LANL release number
</commit_message>
<xml_diff>
--- a/git-workflows.pptx
+++ b/git-workflows.pptx
@@ -279,7 +279,7 @@
           <a:p>
             <a:fld id="{0B842F42-2CE9-4E35-95C1-410DC08A50B1}" type="datetimeFigureOut">
               <a:rPr lang="en-US" smtClean="0"/>
-              <a:t>9/20/21</a:t>
+              <a:t>9/24/2021</a:t>
             </a:fld>
             <a:endParaRPr lang="en-US"/>
           </a:p>
@@ -444,7 +444,7 @@
           <a:p>
             <a:fld id="{6F282904-F315-4730-8D91-37D99E141A6F}" type="datetimeFigureOut">
               <a:rPr lang="en-US" smtClean="0"/>
-              <a:t>9/20/21</a:t>
+              <a:t>9/24/2021</a:t>
             </a:fld>
             <a:endParaRPr lang="en-US"/>
           </a:p>
@@ -6343,15 +6343,7 @@
             </a:pPr>
             <a:r>
               <a:rPr lang="en-US" sz="2000" dirty="0"/>
-              <a:t>Better Scientific </a:t>
-            </a:r>
-            <a:r>
-              <a:rPr lang="en-US" sz="2000"/>
-              <a:t>Software tutorial </a:t>
-            </a:r>
-            <a:r>
-              <a:rPr lang="en-US" sz="2000" dirty="0"/>
-              <a:t>@ SC21</a:t>
+              <a:t>Better Scientific Software tutorial @ SC21</a:t>
             </a:r>
           </a:p>
           <a:p>
@@ -6408,7 +6400,7 @@
           <a:p>
             <a:r>
               <a:rPr lang="en-US" sz="1200" dirty="0"/>
-              <a:t>LA-UR-21-25665</a:t>
+              <a:t>LA-UR-21-29292</a:t>
             </a:r>
           </a:p>
         </p:txBody>
@@ -15943,6 +15935,21 @@
 </file>
 
 <file path=customXml/item1.xml><?xml version="1.0" encoding="utf-8"?>
+<?mso-contentType ?>
+<FormTemplates xmlns="http://schemas.microsoft.com/sharepoint/v3/contenttype/forms">
+  <Display>DocumentLibraryForm</Display>
+  <Edit>DocumentLibraryForm</Edit>
+  <New>DocumentLibraryForm</New>
+</FormTemplates>
+</file>
+
+<file path=customXml/item2.xml><?xml version="1.0" encoding="utf-8"?>
+<p:properties xmlns:p="http://schemas.microsoft.com/office/2006/metadata/properties" xmlns:xsi="http://www.w3.org/2001/XMLSchema-instance" xmlns:pc="http://schemas.microsoft.com/office/infopath/2007/PartnerControls">
+  <documentManagement/>
+</p:properties>
+</file>
+
+<file path=customXml/item3.xml><?xml version="1.0" encoding="utf-8"?>
 <ct:contentTypeSchema xmlns:ct="http://schemas.microsoft.com/office/2006/metadata/contentType" xmlns:ma="http://schemas.microsoft.com/office/2006/metadata/properties/metaAttributes" ct:_="" ma:_="" ma:contentTypeName="Document" ma:contentTypeID="0x010100565464437F680748A68B85EB6594EA7D" ma:contentTypeVersion="0" ma:contentTypeDescription="Create a new document." ma:contentTypeScope="" ma:versionID="fe3f4dd58d5914c51cfc6deaa8ad845c">
   <xsd:schema xmlns:xsd="http://www.w3.org/2001/XMLSchema" xmlns:p="http://schemas.microsoft.com/office/2006/metadata/properties" targetNamespace="http://schemas.microsoft.com/office/2006/metadata/properties" ma:root="true" ma:fieldsID="4aeb20c0e3442673af7ee10786458764">
     <xsd:element name="properties">
@@ -15991,32 +15998,10 @@
 </ct:contentTypeSchema>
 </file>
 
-<file path=customXml/item2.xml><?xml version="1.0" encoding="utf-8"?>
-<p:properties xmlns:p="http://schemas.microsoft.com/office/2006/metadata/properties" xmlns:xsi="http://www.w3.org/2001/XMLSchema-instance" xmlns:pc="http://schemas.microsoft.com/office/infopath/2007/PartnerControls">
-  <documentManagement/>
-</p:properties>
-</file>
-
-<file path=customXml/item3.xml><?xml version="1.0" encoding="utf-8"?>
-<?mso-contentType ?>
-<FormTemplates xmlns="http://schemas.microsoft.com/sharepoint/v3/contenttype/forms">
-  <Display>DocumentLibraryForm</Display>
-  <Edit>DocumentLibraryForm</Edit>
-  <New>DocumentLibraryForm</New>
-</FormTemplates>
-</file>
-
 <file path=customXml/itemProps1.xml><?xml version="1.0" encoding="utf-8"?>
-<ds:datastoreItem xmlns:ds="http://schemas.openxmlformats.org/officeDocument/2006/customXml" ds:itemID="{E8DB7DEB-074E-4EE8-9B6E-FD277323109C}">
+<ds:datastoreItem xmlns:ds="http://schemas.openxmlformats.org/officeDocument/2006/customXml" ds:itemID="{19E20559-B232-4371-8690-E3D8007EDB82}">
   <ds:schemaRefs>
-    <ds:schemaRef ds:uri="http://schemas.microsoft.com/office/2006/metadata/contentType"/>
-    <ds:schemaRef ds:uri="http://schemas.microsoft.com/office/2006/metadata/properties/metaAttributes"/>
-    <ds:schemaRef ds:uri="http://www.w3.org/2001/XMLSchema"/>
-    <ds:schemaRef ds:uri="http://schemas.microsoft.com/office/2006/metadata/properties"/>
-    <ds:schemaRef ds:uri="http://schemas.openxmlformats.org/package/2006/metadata/core-properties"/>
-    <ds:schemaRef ds:uri="http://purl.org/dc/elements/1.1/"/>
-    <ds:schemaRef ds:uri="http://purl.org/dc/terms/"/>
-    <ds:schemaRef ds:uri="http://schemas.microsoft.com/office/internal/2005/internalDocumentation"/>
+    <ds:schemaRef ds:uri="http://schemas.microsoft.com/sharepoint/v3/contenttype/forms"/>
   </ds:schemaRefs>
 </ds:datastoreItem>
 </file>
@@ -16037,9 +16022,16 @@
 </file>
 
 <file path=customXml/itemProps3.xml><?xml version="1.0" encoding="utf-8"?>
-<ds:datastoreItem xmlns:ds="http://schemas.openxmlformats.org/officeDocument/2006/customXml" ds:itemID="{19E20559-B232-4371-8690-E3D8007EDB82}">
+<ds:datastoreItem xmlns:ds="http://schemas.openxmlformats.org/officeDocument/2006/customXml" ds:itemID="{E8DB7DEB-074E-4EE8-9B6E-FD277323109C}">
   <ds:schemaRefs>
-    <ds:schemaRef ds:uri="http://schemas.microsoft.com/sharepoint/v3/contenttype/forms"/>
+    <ds:schemaRef ds:uri="http://schemas.microsoft.com/office/2006/metadata/contentType"/>
+    <ds:schemaRef ds:uri="http://schemas.microsoft.com/office/2006/metadata/properties/metaAttributes"/>
+    <ds:schemaRef ds:uri="http://www.w3.org/2001/XMLSchema"/>
+    <ds:schemaRef ds:uri="http://schemas.microsoft.com/office/2006/metadata/properties"/>
+    <ds:schemaRef ds:uri="http://schemas.openxmlformats.org/package/2006/metadata/core-properties"/>
+    <ds:schemaRef ds:uri="http://purl.org/dc/elements/1.1/"/>
+    <ds:schemaRef ds:uri="http://purl.org/dc/terms/"/>
+    <ds:schemaRef ds:uri="http://schemas.microsoft.com/office/internal/2005/internalDocumentation"/>
   </ds:schemaRefs>
 </ds:datastoreItem>
 </file>
</xml_diff>

<commit_message>
Correct typo on slide 15
</commit_message>
<xml_diff>
--- a/git-workflows.pptx
+++ b/git-workflows.pptx
@@ -279,7 +279,7 @@
           <a:p>
             <a:fld id="{0B842F42-2CE9-4E35-95C1-410DC08A50B1}" type="datetimeFigureOut">
               <a:rPr lang="en-US" smtClean="0"/>
-              <a:t>9/24/2021</a:t>
+              <a:t>10/12/21</a:t>
             </a:fld>
             <a:endParaRPr lang="en-US"/>
           </a:p>
@@ -444,7 +444,7 @@
           <a:p>
             <a:fld id="{6F282904-F315-4730-8D91-37D99E141A6F}" type="datetimeFigureOut">
               <a:rPr lang="en-US" smtClean="0"/>
-              <a:t>9/24/2021</a:t>
+              <a:t>10/12/21</a:t>
             </a:fld>
             <a:endParaRPr lang="en-US"/>
           </a:p>
@@ -7729,7 +7729,7 @@
             <a:pPr lvl="1"/>
             <a:r>
               <a:rPr lang="en-US" dirty="0"/>
-              <a:t>Helpful coding techniques by other’s</a:t>
+              <a:t>Helpful coding techniques by others</a:t>
             </a:r>
           </a:p>
           <a:p>
@@ -15935,18 +15935,18 @@
 </file>
 
 <file path=customXml/item1.xml><?xml version="1.0" encoding="utf-8"?>
+<p:properties xmlns:p="http://schemas.microsoft.com/office/2006/metadata/properties" xmlns:xsi="http://www.w3.org/2001/XMLSchema-instance" xmlns:pc="http://schemas.microsoft.com/office/infopath/2007/PartnerControls">
+  <documentManagement/>
+</p:properties>
+</file>
+
+<file path=customXml/item2.xml><?xml version="1.0" encoding="utf-8"?>
 <?mso-contentType ?>
 <FormTemplates xmlns="http://schemas.microsoft.com/sharepoint/v3/contenttype/forms">
   <Display>DocumentLibraryForm</Display>
   <Edit>DocumentLibraryForm</Edit>
   <New>DocumentLibraryForm</New>
 </FormTemplates>
-</file>
-
-<file path=customXml/item2.xml><?xml version="1.0" encoding="utf-8"?>
-<p:properties xmlns:p="http://schemas.microsoft.com/office/2006/metadata/properties" xmlns:xsi="http://www.w3.org/2001/XMLSchema-instance" xmlns:pc="http://schemas.microsoft.com/office/infopath/2007/PartnerControls">
-  <documentManagement/>
-</p:properties>
 </file>
 
 <file path=customXml/item3.xml><?xml version="1.0" encoding="utf-8"?>
@@ -15999,14 +15999,6 @@
 </file>
 
 <file path=customXml/itemProps1.xml><?xml version="1.0" encoding="utf-8"?>
-<ds:datastoreItem xmlns:ds="http://schemas.openxmlformats.org/officeDocument/2006/customXml" ds:itemID="{19E20559-B232-4371-8690-E3D8007EDB82}">
-  <ds:schemaRefs>
-    <ds:schemaRef ds:uri="http://schemas.microsoft.com/sharepoint/v3/contenttype/forms"/>
-  </ds:schemaRefs>
-</ds:datastoreItem>
-</file>
-
-<file path=customXml/itemProps2.xml><?xml version="1.0" encoding="utf-8"?>
 <ds:datastoreItem xmlns:ds="http://schemas.openxmlformats.org/officeDocument/2006/customXml" ds:itemID="{A50EC660-24D0-43A0-AE5E-E274115E726B}">
   <ds:schemaRefs>
     <ds:schemaRef ds:uri="http://purl.org/dc/elements/1.1/"/>
@@ -16017,6 +16009,14 @@
     <ds:schemaRef ds:uri="http://www.w3.org/XML/1998/namespace"/>
     <ds:schemaRef ds:uri="http://purl.org/dc/dcmitype/"/>
     <ds:schemaRef ds:uri="http://schemas.microsoft.com/office/infopath/2007/PartnerControls"/>
+  </ds:schemaRefs>
+</ds:datastoreItem>
+</file>
+
+<file path=customXml/itemProps2.xml><?xml version="1.0" encoding="utf-8"?>
+<ds:datastoreItem xmlns:ds="http://schemas.openxmlformats.org/officeDocument/2006/customXml" ds:itemID="{19E20559-B232-4371-8690-E3D8007EDB82}">
+  <ds:schemaRefs>
+    <ds:schemaRef ds:uri="http://schemas.microsoft.com/sharepoint/v3/contenttype/forms"/>
   </ds:schemaRefs>
 </ds:datastoreItem>
 </file>

</xml_diff>

<commit_message>
added license slides and updated title slides for all ISC presentations
</commit_message>
<xml_diff>
--- a/git-workflows.pptx
+++ b/git-workflows.pptx
@@ -281,7 +281,7 @@
           <a:p>
             <a:fld id="{0B842F42-2CE9-4E35-95C1-410DC08A50B1}" type="datetimeFigureOut">
               <a:rPr lang="en-US" smtClean="0"/>
-              <a:t>5/17/22</a:t>
+              <a:t>5/18/22</a:t>
             </a:fld>
             <a:endParaRPr lang="en-US"/>
           </a:p>
@@ -446,7 +446,7 @@
           <a:p>
             <a:fld id="{6F282904-F315-4730-8D91-37D99E141A6F}" type="datetimeFigureOut">
               <a:rPr lang="en-US" smtClean="0"/>
-              <a:t>5/17/22</a:t>
+              <a:t>5/18/22</a:t>
             </a:fld>
             <a:endParaRPr lang="en-US"/>
           </a:p>
@@ -6509,7 +6509,7 @@
             </a:pPr>
             <a:r>
               <a:rPr lang="en-US" sz="2000" dirty="0"/>
-              <a:t>Better Scientific Software tutorial @ Improving Scientific Software 2022</a:t>
+              <a:t>Better Scientific Software tutorial @ ISC 2022</a:t>
             </a:r>
           </a:p>
           <a:p>
@@ -9214,21 +9214,16 @@
             </a:pPr>
             <a:r>
               <a:rPr lang="en-US" sz="1600" b="1" dirty="0"/>
-              <a:t>The requested citation the overall tutorial is: David E. Bernholdt, Patricia A. Grubel, Rinku K. Gupta, and David M. Rogers, Better Scientific Software tutorial, in Improving Scientific Software conference, online, 2022. DOI: </a:t>
-            </a:r>
-            <a:r>
-              <a:rPr lang="en-US" sz="1600" b="1" dirty="0">
-                <a:hlinkClick r:id="rId4"/>
-              </a:rPr>
-              <a:t>10.6084/m9.figshare</a:t>
-            </a:r>
-            <a:r>
-              <a:rPr lang="en-US" sz="1600" b="1">
-                <a:hlinkClick r:id="rId4"/>
-              </a:rPr>
-              <a:t>.19416767</a:t>
-            </a:r>
-            <a:endParaRPr lang="en-US" sz="1600" b="1"/>
+              <a:t>The requested citation the overall tutorial is: </a:t>
+            </a:r>
+            <a:r>
+              <a:rPr lang="en-US" sz="1600" b="1" dirty="0" err="1"/>
+              <a:t>Anshu</a:t>
+            </a:r>
+            <a:r>
+              <a:rPr lang="en-US" sz="1600" b="1" dirty="0"/>
+              <a:t> Dubey and Gregory R. Watson, Better Scientific Software Tutorial, in ISC High Performance, 2022, Hamburg Germany. DOI: 10.6084/m9.figshare.19781752</a:t>
+            </a:r>
           </a:p>
           <a:p>
             <a:pPr>
@@ -9246,7 +9241,7 @@
             </a:r>
             <a:r>
               <a:rPr lang="en-US" sz="1600" dirty="0"/>
-              <a:t>, in Better Scientific Software tutorial…</a:t>
+              <a:t>, in Better Scientific Software tutorial, ISC, 2022 …</a:t>
             </a:r>
           </a:p>
           <a:p>
@@ -9365,7 +9360,7 @@
           <p:nvPr/>
         </p:nvPicPr>
         <p:blipFill>
-          <a:blip r:embed="rId5">
+          <a:blip r:embed="rId4">
             <a:extLst>
               <a:ext uri="{28A0092B-C50C-407E-A947-70E740481C1C}">
                 <a14:useLocalDpi xmlns:a14="http://schemas.microsoft.com/office/drawing/2010/main" val="0"/>
@@ -9400,7 +9395,7 @@
     </p:spTree>
     <p:extLst>
       <p:ext uri="{BB962C8B-B14F-4D97-AF65-F5344CB8AC3E}">
-        <p14:creationId xmlns:p14="http://schemas.microsoft.com/office/powerpoint/2010/main" val="978726433"/>
+        <p14:creationId xmlns:p14="http://schemas.microsoft.com/office/powerpoint/2010/main" val="1540804524"/>
       </p:ext>
     </p:extLst>
   </p:cSld>
@@ -16568,6 +16563,21 @@
 </file>
 
 <file path=customXml/item1.xml><?xml version="1.0" encoding="utf-8"?>
+<?mso-contentType ?>
+<FormTemplates xmlns="http://schemas.microsoft.com/sharepoint/v3/contenttype/forms">
+  <Display>DocumentLibraryForm</Display>
+  <Edit>DocumentLibraryForm</Edit>
+  <New>DocumentLibraryForm</New>
+</FormTemplates>
+</file>
+
+<file path=customXml/item2.xml><?xml version="1.0" encoding="utf-8"?>
+<p:properties xmlns:p="http://schemas.microsoft.com/office/2006/metadata/properties" xmlns:xsi="http://www.w3.org/2001/XMLSchema-instance" xmlns:pc="http://schemas.microsoft.com/office/infopath/2007/PartnerControls">
+  <documentManagement/>
+</p:properties>
+</file>
+
+<file path=customXml/item3.xml><?xml version="1.0" encoding="utf-8"?>
 <ct:contentTypeSchema xmlns:ct="http://schemas.microsoft.com/office/2006/metadata/contentType" xmlns:ma="http://schemas.microsoft.com/office/2006/metadata/properties/metaAttributes" ct:_="" ma:_="" ma:contentTypeName="Document" ma:contentTypeID="0x010100565464437F680748A68B85EB6594EA7D" ma:contentTypeVersion="0" ma:contentTypeDescription="Create a new document." ma:contentTypeScope="" ma:versionID="fe3f4dd58d5914c51cfc6deaa8ad845c">
   <xsd:schema xmlns:xsd="http://www.w3.org/2001/XMLSchema" xmlns:p="http://schemas.microsoft.com/office/2006/metadata/properties" targetNamespace="http://schemas.microsoft.com/office/2006/metadata/properties" ma:root="true" ma:fieldsID="4aeb20c0e3442673af7ee10786458764">
     <xsd:element name="properties">
@@ -16616,32 +16626,10 @@
 </ct:contentTypeSchema>
 </file>
 
-<file path=customXml/item2.xml><?xml version="1.0" encoding="utf-8"?>
-<p:properties xmlns:p="http://schemas.microsoft.com/office/2006/metadata/properties" xmlns:xsi="http://www.w3.org/2001/XMLSchema-instance" xmlns:pc="http://schemas.microsoft.com/office/infopath/2007/PartnerControls">
-  <documentManagement/>
-</p:properties>
-</file>
-
-<file path=customXml/item3.xml><?xml version="1.0" encoding="utf-8"?>
-<?mso-contentType ?>
-<FormTemplates xmlns="http://schemas.microsoft.com/sharepoint/v3/contenttype/forms">
-  <Display>DocumentLibraryForm</Display>
-  <Edit>DocumentLibraryForm</Edit>
-  <New>DocumentLibraryForm</New>
-</FormTemplates>
-</file>
-
 <file path=customXml/itemProps1.xml><?xml version="1.0" encoding="utf-8"?>
-<ds:datastoreItem xmlns:ds="http://schemas.openxmlformats.org/officeDocument/2006/customXml" ds:itemID="{E8DB7DEB-074E-4EE8-9B6E-FD277323109C}">
+<ds:datastoreItem xmlns:ds="http://schemas.openxmlformats.org/officeDocument/2006/customXml" ds:itemID="{19E20559-B232-4371-8690-E3D8007EDB82}">
   <ds:schemaRefs>
-    <ds:schemaRef ds:uri="http://schemas.microsoft.com/office/2006/metadata/contentType"/>
-    <ds:schemaRef ds:uri="http://schemas.microsoft.com/office/2006/metadata/properties/metaAttributes"/>
-    <ds:schemaRef ds:uri="http://www.w3.org/2001/XMLSchema"/>
-    <ds:schemaRef ds:uri="http://schemas.microsoft.com/office/2006/metadata/properties"/>
-    <ds:schemaRef ds:uri="http://schemas.openxmlformats.org/package/2006/metadata/core-properties"/>
-    <ds:schemaRef ds:uri="http://purl.org/dc/elements/1.1/"/>
-    <ds:schemaRef ds:uri="http://purl.org/dc/terms/"/>
-    <ds:schemaRef ds:uri="http://schemas.microsoft.com/office/internal/2005/internalDocumentation"/>
+    <ds:schemaRef ds:uri="http://schemas.microsoft.com/sharepoint/v3/contenttype/forms"/>
   </ds:schemaRefs>
 </ds:datastoreItem>
 </file>
@@ -16662,9 +16650,16 @@
 </file>
 
 <file path=customXml/itemProps3.xml><?xml version="1.0" encoding="utf-8"?>
-<ds:datastoreItem xmlns:ds="http://schemas.openxmlformats.org/officeDocument/2006/customXml" ds:itemID="{19E20559-B232-4371-8690-E3D8007EDB82}">
+<ds:datastoreItem xmlns:ds="http://schemas.openxmlformats.org/officeDocument/2006/customXml" ds:itemID="{E8DB7DEB-074E-4EE8-9B6E-FD277323109C}">
   <ds:schemaRefs>
-    <ds:schemaRef ds:uri="http://schemas.microsoft.com/sharepoint/v3/contenttype/forms"/>
+    <ds:schemaRef ds:uri="http://schemas.microsoft.com/office/2006/metadata/contentType"/>
+    <ds:schemaRef ds:uri="http://schemas.microsoft.com/office/2006/metadata/properties/metaAttributes"/>
+    <ds:schemaRef ds:uri="http://www.w3.org/2001/XMLSchema"/>
+    <ds:schemaRef ds:uri="http://schemas.microsoft.com/office/2006/metadata/properties"/>
+    <ds:schemaRef ds:uri="http://schemas.openxmlformats.org/package/2006/metadata/core-properties"/>
+    <ds:schemaRef ds:uri="http://purl.org/dc/elements/1.1/"/>
+    <ds:schemaRef ds:uri="http://purl.org/dc/terms/"/>
+    <ds:schemaRef ds:uri="http://schemas.microsoft.com/office/internal/2005/internalDocumentation"/>
   </ds:schemaRefs>
 </ds:datastoreItem>
 </file>
</xml_diff>